<commit_message>
little changes to final ppt 3
</commit_message>
<xml_diff>
--- a/Final presentation_v3.pptx
+++ b/Final presentation_v3.pptx
@@ -31,10 +31,10 @@
     <p:sldId id="283" r:id="rId22"/>
     <p:sldId id="285" r:id="rId23"/>
     <p:sldId id="328" r:id="rId24"/>
-    <p:sldId id="287" r:id="rId25"/>
-    <p:sldId id="304" r:id="rId26"/>
-    <p:sldId id="288" r:id="rId27"/>
-    <p:sldId id="305" r:id="rId28"/>
+    <p:sldId id="304" r:id="rId25"/>
+    <p:sldId id="287" r:id="rId26"/>
+    <p:sldId id="305" r:id="rId27"/>
+    <p:sldId id="288" r:id="rId28"/>
     <p:sldId id="300" r:id="rId29"/>
     <p:sldId id="302" r:id="rId30"/>
     <p:sldId id="311" r:id="rId31"/>
@@ -238,7 +238,7 @@
           <a:p>
             <a:fld id="{B3E803FA-11BA-4290-A53C-9700EB796447}" type="datetimeFigureOut">
               <a:rPr lang="he-IL" smtClean="0"/>
-              <a:t>כ"ו/סיון/תש"ף</a:t>
+              <a:t>כ"ט/סיון/תש"ף</a:t>
             </a:fld>
             <a:endParaRPr lang="he-IL"/>
           </a:p>
@@ -635,529 +635,6 @@
 </file>
 
 <file path=ppt/notesSlides/notesSlide10.xml><?xml version="1.0" encoding="utf-8"?>
-<p:notes xmlns:a="http://schemas.openxmlformats.org/drawingml/2006/main" xmlns:r="http://schemas.openxmlformats.org/officeDocument/2006/relationships" xmlns:p="http://schemas.openxmlformats.org/presentationml/2006/main">
-  <p:cSld>
-    <p:spTree>
-      <p:nvGrpSpPr>
-        <p:cNvPr id="1" name=""/>
-        <p:cNvGrpSpPr/>
-        <p:nvPr/>
-      </p:nvGrpSpPr>
-      <p:grpSpPr>
-        <a:xfrm>
-          <a:off x="0" y="0"/>
-          <a:ext cx="0" cy="0"/>
-          <a:chOff x="0" y="0"/>
-          <a:chExt cx="0" cy="0"/>
-        </a:xfrm>
-      </p:grpSpPr>
-      <p:sp>
-        <p:nvSpPr>
-          <p:cNvPr id="2" name="Slide Image Placeholder 1"/>
-          <p:cNvSpPr>
-            <a:spLocks noGrp="1" noRot="1" noChangeAspect="1"/>
-          </p:cNvSpPr>
-          <p:nvPr>
-            <p:ph type="sldImg"/>
-          </p:nvPr>
-        </p:nvSpPr>
-        <p:spPr/>
-      </p:sp>
-      <mc:AlternateContent xmlns:mc="http://schemas.openxmlformats.org/markup-compatibility/2006" xmlns:a14="http://schemas.microsoft.com/office/drawing/2010/main">
-        <mc:Choice Requires="a14">
-          <p:sp>
-            <p:nvSpPr>
-              <p:cNvPr id="3" name="Notes Placeholder 2"/>
-              <p:cNvSpPr>
-                <a:spLocks noGrp="1"/>
-              </p:cNvSpPr>
-              <p:nvPr>
-                <p:ph type="body" idx="1"/>
-              </p:nvPr>
-            </p:nvSpPr>
-            <p:spPr/>
-            <p:txBody>
-              <a:bodyPr/>
-              <a:lstStyle/>
-              <a:p>
-                <a:endParaRPr lang="en-US" sz="1200" i="1" kern="1200" dirty="0">
-                  <a:solidFill>
-                    <a:schemeClr val="tx1"/>
-                  </a:solidFill>
-                  <a:effectLst/>
-                  <a:latin typeface="+mn-lt"/>
-                  <a:ea typeface="+mn-ea"/>
-                  <a:cs typeface="+mn-cs"/>
-                </a:endParaRPr>
-              </a:p>
-              <a:p>
-                <a:pPr marL="0" marR="0" lvl="0" indent="0" algn="r" defTabSz="914400" rtl="1" eaLnBrk="1" fontAlgn="auto" latinLnBrk="0" hangingPunct="1">
-                  <a:lnSpc>
-                    <a:spcPct val="100000"/>
-                  </a:lnSpc>
-                  <a:spcBef>
-                    <a:spcPts val="0"/>
-                  </a:spcBef>
-                  <a:spcAft>
-                    <a:spcPts val="0"/>
-                  </a:spcAft>
-                  <a:buClrTx/>
-                  <a:buSzTx/>
-                  <a:buFontTx/>
-                  <a:buNone/>
-                  <a:tabLst/>
-                  <a:defRPr/>
-                </a:pPr>
-                <a:r>
-                  <a:rPr lang="en-US" dirty="0">
-                    <a:latin typeface="Calibri" panose="020F0502020204030204" pitchFamily="34" charset="0"/>
-                    <a:ea typeface="Calibri" panose="020F0502020204030204" pitchFamily="34" charset="0"/>
-                    <a:cs typeface="Arial" panose="020B0604020202020204" pitchFamily="34" charset="0"/>
-                  </a:rPr>
-                  <a:t> Three clock cycles are needed to fill this module pipeline. </a:t>
-                </a:r>
-                <a:r>
-                  <a:rPr lang="en-US" dirty="0"/>
-                  <a:t>After the pipeline is filled, every clock cycle a new point is classified. As the final data point enters the pipeline, it must go thought the pipeline stages, hence three more clock cycles are needed to complete the classification block functionality.</a:t>
-                </a:r>
-              </a:p>
-              <a:p>
-                <a:endParaRPr lang="en-US" sz="1200" i="1" kern="1200" dirty="0">
-                  <a:solidFill>
-                    <a:schemeClr val="tx1"/>
-                  </a:solidFill>
-                  <a:effectLst/>
-                  <a:latin typeface="+mn-lt"/>
-                  <a:ea typeface="+mn-ea"/>
-                  <a:cs typeface="+mn-cs"/>
-                </a:endParaRPr>
-              </a:p>
-              <a:p>
-                <a:pPr/>
-                <a14:m>
-                  <m:oMathPara xmlns:m="http://schemas.openxmlformats.org/officeDocument/2006/math">
-                    <m:oMathParaPr>
-                      <m:jc m:val="centerGroup"/>
-                    </m:oMathParaPr>
-                    <m:oMath xmlns:m="http://schemas.openxmlformats.org/officeDocument/2006/math">
-                      <m:r>
-                        <a:rPr lang="en-US" sz="1200" i="1" kern="1200">
-                          <a:solidFill>
-                            <a:schemeClr val="tx1"/>
-                          </a:solidFill>
-                          <a:effectLst/>
-                          <a:latin typeface="Cambria Math" panose="02040503050406030204" pitchFamily="18" charset="0"/>
-                          <a:ea typeface="+mn-ea"/>
-                          <a:cs typeface="+mn-cs"/>
-                        </a:rPr>
-                        <m:t>𝑙𝑎𝑡𝑒𝑛𝑐</m:t>
-                      </m:r>
-                      <m:sSub>
-                        <m:sSubPr>
-                          <m:ctrlPr>
-                            <a:rPr lang="en-US" sz="1200" i="1" kern="1200">
-                              <a:solidFill>
-                                <a:schemeClr val="tx1"/>
-                              </a:solidFill>
-                              <a:effectLst/>
-                              <a:latin typeface="Cambria Math" panose="02040503050406030204" pitchFamily="18" charset="0"/>
-                              <a:ea typeface="+mn-ea"/>
-                              <a:cs typeface="+mn-cs"/>
-                            </a:rPr>
-                          </m:ctrlPr>
-                        </m:sSubPr>
-                        <m:e>
-                          <m:r>
-                            <a:rPr lang="en-US" sz="1200" i="1" kern="1200">
-                              <a:solidFill>
-                                <a:schemeClr val="tx1"/>
-                              </a:solidFill>
-                              <a:effectLst/>
-                              <a:latin typeface="Cambria Math" panose="02040503050406030204" pitchFamily="18" charset="0"/>
-                              <a:ea typeface="+mn-ea"/>
-                              <a:cs typeface="+mn-cs"/>
-                            </a:rPr>
-                            <m:t>𝑦</m:t>
-                          </m:r>
-                        </m:e>
-                        <m:sub>
-                          <m:r>
-                            <a:rPr lang="en-US" sz="1200" i="1" kern="1200">
-                              <a:solidFill>
-                                <a:schemeClr val="tx1"/>
-                              </a:solidFill>
-                              <a:effectLst/>
-                              <a:latin typeface="Cambria Math" panose="02040503050406030204" pitchFamily="18" charset="0"/>
-                              <a:ea typeface="+mn-ea"/>
-                              <a:cs typeface="+mn-cs"/>
-                            </a:rPr>
-                            <m:t>𝑝𝑖𝑝𝑒</m:t>
-                          </m:r>
-                          <m:r>
-                            <a:rPr lang="en-US" sz="1200" i="1" kern="1200">
-                              <a:solidFill>
-                                <a:schemeClr val="tx1"/>
-                              </a:solidFill>
-                              <a:effectLst/>
-                              <a:latin typeface="Cambria Math" panose="02040503050406030204" pitchFamily="18" charset="0"/>
-                              <a:ea typeface="+mn-ea"/>
-                              <a:cs typeface="+mn-cs"/>
-                            </a:rPr>
-                            <m:t>1</m:t>
-                          </m:r>
-                        </m:sub>
-                      </m:sSub>
-                      <m:r>
-                        <a:rPr lang="en-US" sz="1200" i="1" kern="1200">
-                          <a:solidFill>
-                            <a:schemeClr val="tx1"/>
-                          </a:solidFill>
-                          <a:effectLst/>
-                          <a:latin typeface="Cambria Math" panose="02040503050406030204" pitchFamily="18" charset="0"/>
-                          <a:ea typeface="+mn-ea"/>
-                          <a:cs typeface="+mn-cs"/>
-                        </a:rPr>
-                        <m:t>=</m:t>
-                      </m:r>
-                      <m:r>
-                        <a:rPr lang="en-US" sz="1200" i="1" kern="1200">
-                          <a:solidFill>
-                            <a:schemeClr val="tx1"/>
-                          </a:solidFill>
-                          <a:effectLst/>
-                          <a:latin typeface="Cambria Math" panose="02040503050406030204" pitchFamily="18" charset="0"/>
-                          <a:ea typeface="+mn-ea"/>
-                          <a:cs typeface="+mn-cs"/>
-                        </a:rPr>
-                        <m:t>3</m:t>
-                      </m:r>
-                      <m:r>
-                        <a:rPr lang="en-US" sz="1200" i="1" kern="1200">
-                          <a:solidFill>
-                            <a:schemeClr val="tx1"/>
-                          </a:solidFill>
-                          <a:effectLst/>
-                          <a:latin typeface="Cambria Math" panose="02040503050406030204" pitchFamily="18" charset="0"/>
-                          <a:ea typeface="+mn-ea"/>
-                          <a:cs typeface="+mn-cs"/>
-                        </a:rPr>
-                        <m:t>+</m:t>
-                      </m:r>
-                      <m:d>
-                        <m:dPr>
-                          <m:ctrlPr>
-                            <a:rPr lang="en-US" sz="1200" i="1" kern="1200">
-                              <a:solidFill>
-                                <a:schemeClr val="tx1"/>
-                              </a:solidFill>
-                              <a:effectLst/>
-                              <a:latin typeface="Cambria Math" panose="02040503050406030204" pitchFamily="18" charset="0"/>
-                              <a:ea typeface="+mn-ea"/>
-                              <a:cs typeface="+mn-cs"/>
-                            </a:rPr>
-                          </m:ctrlPr>
-                        </m:dPr>
-                        <m:e>
-                          <m:r>
-                            <a:rPr lang="en-US" sz="1200" i="1" kern="1200">
-                              <a:solidFill>
-                                <a:schemeClr val="tx1"/>
-                              </a:solidFill>
-                              <a:effectLst/>
-                              <a:latin typeface="Cambria Math" panose="02040503050406030204" pitchFamily="18" charset="0"/>
-                              <a:ea typeface="+mn-ea"/>
-                              <a:cs typeface="+mn-cs"/>
-                            </a:rPr>
-                            <m:t>𝑛𝑢𝑚𝑏𝑒𝑟</m:t>
-                          </m:r>
-                          <m:r>
-                            <a:rPr lang="en-US" sz="1200" i="1" kern="1200">
-                              <a:solidFill>
-                                <a:schemeClr val="tx1"/>
-                              </a:solidFill>
-                              <a:effectLst/>
-                              <a:latin typeface="Cambria Math" panose="02040503050406030204" pitchFamily="18" charset="0"/>
-                              <a:ea typeface="+mn-ea"/>
-                              <a:cs typeface="+mn-cs"/>
-                            </a:rPr>
-                            <m:t> </m:t>
-                          </m:r>
-                          <m:r>
-                            <a:rPr lang="en-US" sz="1200" i="1" kern="1200">
-                              <a:solidFill>
-                                <a:schemeClr val="tx1"/>
-                              </a:solidFill>
-                              <a:effectLst/>
-                              <a:latin typeface="Cambria Math" panose="02040503050406030204" pitchFamily="18" charset="0"/>
-                              <a:ea typeface="+mn-ea"/>
-                              <a:cs typeface="+mn-cs"/>
-                            </a:rPr>
-                            <m:t>𝑜𝑓</m:t>
-                          </m:r>
-                          <m:r>
-                            <a:rPr lang="en-US" sz="1200" i="1" kern="1200">
-                              <a:solidFill>
-                                <a:schemeClr val="tx1"/>
-                              </a:solidFill>
-                              <a:effectLst/>
-                              <a:latin typeface="Cambria Math" panose="02040503050406030204" pitchFamily="18" charset="0"/>
-                              <a:ea typeface="+mn-ea"/>
-                              <a:cs typeface="+mn-cs"/>
-                            </a:rPr>
-                            <m:t> </m:t>
-                          </m:r>
-                          <m:r>
-                            <a:rPr lang="en-US" sz="1200" i="1" kern="1200">
-                              <a:solidFill>
-                                <a:schemeClr val="tx1"/>
-                              </a:solidFill>
-                              <a:effectLst/>
-                              <a:latin typeface="Cambria Math" panose="02040503050406030204" pitchFamily="18" charset="0"/>
-                              <a:ea typeface="+mn-ea"/>
-                              <a:cs typeface="+mn-cs"/>
-                            </a:rPr>
-                            <m:t>𝑝𝑜𝑖𝑛𝑡𝑠</m:t>
-                          </m:r>
-                        </m:e>
-                      </m:d>
-                      <m:r>
-                        <a:rPr lang="en-US" sz="1200" i="1" kern="1200">
-                          <a:solidFill>
-                            <a:schemeClr val="tx1"/>
-                          </a:solidFill>
-                          <a:effectLst/>
-                          <a:latin typeface="Cambria Math" panose="02040503050406030204" pitchFamily="18" charset="0"/>
-                          <a:ea typeface="+mn-ea"/>
-                          <a:cs typeface="+mn-cs"/>
-                        </a:rPr>
-                        <m:t>+</m:t>
-                      </m:r>
-                      <m:r>
-                        <a:rPr lang="en-US" sz="1200" i="1" kern="1200">
-                          <a:solidFill>
-                            <a:schemeClr val="tx1"/>
-                          </a:solidFill>
-                          <a:effectLst/>
-                          <a:latin typeface="Cambria Math" panose="02040503050406030204" pitchFamily="18" charset="0"/>
-                          <a:ea typeface="+mn-ea"/>
-                          <a:cs typeface="+mn-cs"/>
-                        </a:rPr>
-                        <m:t>3</m:t>
-                      </m:r>
-                      <m:r>
-                        <a:rPr lang="en-US" sz="1200" i="1" kern="1200">
-                          <a:solidFill>
-                            <a:schemeClr val="tx1"/>
-                          </a:solidFill>
-                          <a:effectLst/>
-                          <a:latin typeface="Cambria Math" panose="02040503050406030204" pitchFamily="18" charset="0"/>
-                          <a:ea typeface="+mn-ea"/>
-                          <a:cs typeface="+mn-cs"/>
-                        </a:rPr>
-                        <m:t> [</m:t>
-                      </m:r>
-                      <m:r>
-                        <a:rPr lang="en-US" sz="1200" i="1" kern="1200">
-                          <a:solidFill>
-                            <a:schemeClr val="tx1"/>
-                          </a:solidFill>
-                          <a:effectLst/>
-                          <a:latin typeface="Cambria Math" panose="02040503050406030204" pitchFamily="18" charset="0"/>
-                          <a:ea typeface="+mn-ea"/>
-                          <a:cs typeface="+mn-cs"/>
-                        </a:rPr>
-                        <m:t>𝑐𝑙𝑜𝑐𝑘</m:t>
-                      </m:r>
-                      <m:r>
-                        <a:rPr lang="en-US" sz="1200" i="1" kern="1200">
-                          <a:solidFill>
-                            <a:schemeClr val="tx1"/>
-                          </a:solidFill>
-                          <a:effectLst/>
-                          <a:latin typeface="Cambria Math" panose="02040503050406030204" pitchFamily="18" charset="0"/>
-                          <a:ea typeface="+mn-ea"/>
-                          <a:cs typeface="+mn-cs"/>
-                        </a:rPr>
-                        <m:t> </m:t>
-                      </m:r>
-                      <m:r>
-                        <a:rPr lang="en-US" sz="1200" i="1" kern="1200">
-                          <a:solidFill>
-                            <a:schemeClr val="tx1"/>
-                          </a:solidFill>
-                          <a:effectLst/>
-                          <a:latin typeface="Cambria Math" panose="02040503050406030204" pitchFamily="18" charset="0"/>
-                          <a:ea typeface="+mn-ea"/>
-                          <a:cs typeface="+mn-cs"/>
-                        </a:rPr>
-                        <m:t>𝑐𝑦𝑐𝑙𝑒𝑠</m:t>
-                      </m:r>
-                      <m:r>
-                        <a:rPr lang="en-US" sz="1200" i="1" kern="1200">
-                          <a:solidFill>
-                            <a:schemeClr val="tx1"/>
-                          </a:solidFill>
-                          <a:effectLst/>
-                          <a:latin typeface="Cambria Math" panose="02040503050406030204" pitchFamily="18" charset="0"/>
-                          <a:ea typeface="+mn-ea"/>
-                          <a:cs typeface="+mn-cs"/>
-                        </a:rPr>
-                        <m:t>]</m:t>
-                      </m:r>
-                    </m:oMath>
-                  </m:oMathPara>
-                </a14:m>
-                <a:endParaRPr lang="en-US" sz="1200" kern="1200" dirty="0">
-                  <a:solidFill>
-                    <a:schemeClr val="tx1"/>
-                  </a:solidFill>
-                  <a:effectLst/>
-                  <a:latin typeface="+mn-lt"/>
-                  <a:ea typeface="+mn-ea"/>
-                  <a:cs typeface="+mn-cs"/>
-                </a:endParaRPr>
-              </a:p>
-              <a:p>
-                <a:endParaRPr lang="en-US" dirty="0"/>
-              </a:p>
-            </p:txBody>
-          </p:sp>
-        </mc:Choice>
-        <mc:Fallback xmlns="">
-          <p:sp>
-            <p:nvSpPr>
-              <p:cNvPr id="3" name="Notes Placeholder 2"/>
-              <p:cNvSpPr>
-                <a:spLocks noGrp="1"/>
-              </p:cNvSpPr>
-              <p:nvPr>
-                <p:ph type="body" idx="1"/>
-              </p:nvPr>
-            </p:nvSpPr>
-            <p:spPr/>
-            <p:txBody>
-              <a:bodyPr/>
-              <a:lstStyle/>
-              <a:p>
-                <a:endParaRPr lang="en-US" sz="1200" i="1" kern="1200" dirty="0">
-                  <a:solidFill>
-                    <a:schemeClr val="tx1"/>
-                  </a:solidFill>
-                  <a:effectLst/>
-                  <a:latin typeface="+mn-lt"/>
-                  <a:ea typeface="+mn-ea"/>
-                  <a:cs typeface="+mn-cs"/>
-                </a:endParaRPr>
-              </a:p>
-              <a:p>
-                <a:pPr marL="0" marR="0" lvl="0" indent="0" algn="r" defTabSz="914400" rtl="1" eaLnBrk="1" fontAlgn="auto" latinLnBrk="0" hangingPunct="1">
-                  <a:lnSpc>
-                    <a:spcPct val="100000"/>
-                  </a:lnSpc>
-                  <a:spcBef>
-                    <a:spcPts val="0"/>
-                  </a:spcBef>
-                  <a:spcAft>
-                    <a:spcPts val="0"/>
-                  </a:spcAft>
-                  <a:buClrTx/>
-                  <a:buSzTx/>
-                  <a:buFontTx/>
-                  <a:buNone/>
-                  <a:tabLst/>
-                  <a:defRPr/>
-                </a:pPr>
-                <a:r>
-                  <a:rPr lang="en-US" dirty="0">
-                    <a:latin typeface="Calibri" panose="020F0502020204030204" pitchFamily="34" charset="0"/>
-                    <a:ea typeface="Calibri" panose="020F0502020204030204" pitchFamily="34" charset="0"/>
-                    <a:cs typeface="Arial" panose="020B0604020202020204" pitchFamily="34" charset="0"/>
-                  </a:rPr>
-                  <a:t> Three clock cycles are needed to fill this module pipeline. </a:t>
-                </a:r>
-                <a:r>
-                  <a:rPr lang="en-US" dirty="0"/>
-                  <a:t>After the pipeline is filled, every clock cycle a new point is classified. As the final data point enters the pipeline, it must go thought the pipeline stages, hence three more clock cycles are needed to complete the classification block functionality.</a:t>
-                </a:r>
-              </a:p>
-              <a:p>
-                <a:endParaRPr lang="en-US" sz="1200" i="1" kern="1200" dirty="0">
-                  <a:solidFill>
-                    <a:schemeClr val="tx1"/>
-                  </a:solidFill>
-                  <a:effectLst/>
-                  <a:latin typeface="+mn-lt"/>
-                  <a:ea typeface="+mn-ea"/>
-                  <a:cs typeface="+mn-cs"/>
-                </a:endParaRPr>
-              </a:p>
-              <a:p>
-                <a:r>
-                  <a:rPr lang="en-US" sz="1200" i="0" kern="1200">
-                    <a:solidFill>
-                      <a:schemeClr val="tx1"/>
-                    </a:solidFill>
-                    <a:effectLst/>
-                    <a:latin typeface="+mn-lt"/>
-                    <a:ea typeface="+mn-ea"/>
-                    <a:cs typeface="+mn-cs"/>
-                  </a:rPr>
-                  <a:t>𝑙𝑎𝑡𝑒𝑛𝑐𝑦_𝑝𝑖𝑝𝑒1=3+(𝑛𝑢𝑚𝑏𝑒𝑟 𝑜𝑓 𝑝𝑜𝑖𝑛𝑡𝑠)+3 [𝑐𝑙𝑜𝑐𝑘 𝑐𝑦𝑐𝑙𝑒𝑠]</a:t>
-                </a:r>
-                <a:endParaRPr lang="en-US" sz="1200" kern="1200" dirty="0">
-                  <a:solidFill>
-                    <a:schemeClr val="tx1"/>
-                  </a:solidFill>
-                  <a:effectLst/>
-                  <a:latin typeface="+mn-lt"/>
-                  <a:ea typeface="+mn-ea"/>
-                  <a:cs typeface="+mn-cs"/>
-                </a:endParaRPr>
-              </a:p>
-              <a:p>
-                <a:endParaRPr lang="en-US" dirty="0"/>
-              </a:p>
-            </p:txBody>
-          </p:sp>
-        </mc:Fallback>
-      </mc:AlternateContent>
-      <p:sp>
-        <p:nvSpPr>
-          <p:cNvPr id="4" name="Slide Number Placeholder 3"/>
-          <p:cNvSpPr>
-            <a:spLocks noGrp="1"/>
-          </p:cNvSpPr>
-          <p:nvPr>
-            <p:ph type="sldNum" sz="quarter" idx="5"/>
-          </p:nvPr>
-        </p:nvSpPr>
-        <p:spPr/>
-        <p:txBody>
-          <a:bodyPr/>
-          <a:lstStyle/>
-          <a:p>
-            <a:fld id="{A47A8C64-5C8B-40B3-A683-36C8893A9F2F}" type="slidenum">
-              <a:rPr lang="he-IL" smtClean="0"/>
-              <a:t>24</a:t>
-            </a:fld>
-            <a:endParaRPr lang="he-IL"/>
-          </a:p>
-        </p:txBody>
-      </p:sp>
-    </p:spTree>
-    <p:extLst>
-      <p:ext uri="{BB962C8B-B14F-4D97-AF65-F5344CB8AC3E}">
-        <p14:creationId xmlns:p14="http://schemas.microsoft.com/office/powerpoint/2010/main" val="1663352089"/>
-      </p:ext>
-    </p:extLst>
-  </p:cSld>
-  <p:clrMapOvr>
-    <a:masterClrMapping/>
-  </p:clrMapOvr>
-</p:notes>
-</file>
-
-<file path=ppt/notesSlides/notesSlide11.xml><?xml version="1.0" encoding="utf-8"?>
 <p:notes xmlns:a="http://schemas.openxmlformats.org/drawingml/2006/main" xmlns:r="http://schemas.openxmlformats.org/officeDocument/2006/relationships" xmlns:p="http://schemas.openxmlformats.org/presentationml/2006/main">
   <p:cSld>
     <p:spTree>
@@ -1933,7 +1410,7 @@
           <a:p>
             <a:fld id="{A47A8C64-5C8B-40B3-A683-36C8893A9F2F}" type="slidenum">
               <a:rPr lang="he-IL" smtClean="0"/>
-              <a:t>25</a:t>
+              <a:t>24</a:t>
             </a:fld>
             <a:endParaRPr lang="he-IL"/>
           </a:p>
@@ -1952,7 +1429,7 @@
 </p:notes>
 </file>
 
-<file path=ppt/notesSlides/notesSlide12.xml><?xml version="1.0" encoding="utf-8"?>
+<file path=ppt/notesSlides/notesSlide11.xml><?xml version="1.0" encoding="utf-8"?>
 <p:notes xmlns:a="http://schemas.openxmlformats.org/drawingml/2006/main" xmlns:r="http://schemas.openxmlformats.org/officeDocument/2006/relationships" xmlns:p="http://schemas.openxmlformats.org/presentationml/2006/main">
   <p:cSld>
     <p:spTree>
@@ -1981,14 +1458,472 @@
         </p:nvSpPr>
         <p:spPr/>
       </p:sp>
-      <p:sp>
-        <p:nvSpPr>
-          <p:cNvPr id="3" name="Notes Placeholder 2"/>
+      <mc:AlternateContent xmlns:mc="http://schemas.openxmlformats.org/markup-compatibility/2006" xmlns:a14="http://schemas.microsoft.com/office/drawing/2010/main">
+        <mc:Choice Requires="a14">
+          <p:sp>
+            <p:nvSpPr>
+              <p:cNvPr id="3" name="Notes Placeholder 2"/>
+              <p:cNvSpPr>
+                <a:spLocks noGrp="1"/>
+              </p:cNvSpPr>
+              <p:nvPr>
+                <p:ph type="body" idx="1"/>
+              </p:nvPr>
+            </p:nvSpPr>
+            <p:spPr/>
+            <p:txBody>
+              <a:bodyPr/>
+              <a:lstStyle/>
+              <a:p>
+                <a:endParaRPr lang="en-US" sz="1200" i="1" kern="1200" dirty="0">
+                  <a:solidFill>
+                    <a:schemeClr val="tx1"/>
+                  </a:solidFill>
+                  <a:effectLst/>
+                  <a:latin typeface="+mn-lt"/>
+                  <a:ea typeface="+mn-ea"/>
+                  <a:cs typeface="+mn-cs"/>
+                </a:endParaRPr>
+              </a:p>
+              <a:p>
+                <a:pPr marL="0" marR="0" lvl="0" indent="0" algn="r" defTabSz="914400" rtl="1" eaLnBrk="1" fontAlgn="auto" latinLnBrk="0" hangingPunct="1">
+                  <a:lnSpc>
+                    <a:spcPct val="100000"/>
+                  </a:lnSpc>
+                  <a:spcBef>
+                    <a:spcPts val="0"/>
+                  </a:spcBef>
+                  <a:spcAft>
+                    <a:spcPts val="0"/>
+                  </a:spcAft>
+                  <a:buClrTx/>
+                  <a:buSzTx/>
+                  <a:buFontTx/>
+                  <a:buNone/>
+                  <a:tabLst/>
+                  <a:defRPr/>
+                </a:pPr>
+                <a:r>
+                  <a:rPr lang="en-US" dirty="0">
+                    <a:latin typeface="Calibri" panose="020F0502020204030204" pitchFamily="34" charset="0"/>
+                    <a:ea typeface="Calibri" panose="020F0502020204030204" pitchFamily="34" charset="0"/>
+                    <a:cs typeface="Arial" panose="020B0604020202020204" pitchFamily="34" charset="0"/>
+                  </a:rPr>
+                  <a:t> Three clock cycles are needed to fill this module pipeline. </a:t>
+                </a:r>
+                <a:r>
+                  <a:rPr lang="en-US" dirty="0"/>
+                  <a:t>After the pipeline is filled, every clock cycle a new point is classified. As the final data point enters the pipeline, it must go thought the pipeline stages, hence three more clock cycles are needed to complete the classification block functionality.</a:t>
+                </a:r>
+              </a:p>
+              <a:p>
+                <a:endParaRPr lang="en-US" sz="1200" i="1" kern="1200" dirty="0">
+                  <a:solidFill>
+                    <a:schemeClr val="tx1"/>
+                  </a:solidFill>
+                  <a:effectLst/>
+                  <a:latin typeface="+mn-lt"/>
+                  <a:ea typeface="+mn-ea"/>
+                  <a:cs typeface="+mn-cs"/>
+                </a:endParaRPr>
+              </a:p>
+              <a:p>
+                <a:pPr/>
+                <a14:m>
+                  <m:oMathPara xmlns:m="http://schemas.openxmlformats.org/officeDocument/2006/math">
+                    <m:oMathParaPr>
+                      <m:jc m:val="centerGroup"/>
+                    </m:oMathParaPr>
+                    <m:oMath xmlns:m="http://schemas.openxmlformats.org/officeDocument/2006/math">
+                      <m:r>
+                        <a:rPr lang="en-US" sz="1200" i="1" kern="1200">
+                          <a:solidFill>
+                            <a:schemeClr val="tx1"/>
+                          </a:solidFill>
+                          <a:effectLst/>
+                          <a:latin typeface="Cambria Math" panose="02040503050406030204" pitchFamily="18" charset="0"/>
+                          <a:ea typeface="+mn-ea"/>
+                          <a:cs typeface="+mn-cs"/>
+                        </a:rPr>
+                        <m:t>𝑙𝑎𝑡𝑒𝑛𝑐</m:t>
+                      </m:r>
+                      <m:sSub>
+                        <m:sSubPr>
+                          <m:ctrlPr>
+                            <a:rPr lang="en-US" sz="1200" i="1" kern="1200">
+                              <a:solidFill>
+                                <a:schemeClr val="tx1"/>
+                              </a:solidFill>
+                              <a:effectLst/>
+                              <a:latin typeface="Cambria Math" panose="02040503050406030204" pitchFamily="18" charset="0"/>
+                              <a:ea typeface="+mn-ea"/>
+                              <a:cs typeface="+mn-cs"/>
+                            </a:rPr>
+                          </m:ctrlPr>
+                        </m:sSubPr>
+                        <m:e>
+                          <m:r>
+                            <a:rPr lang="en-US" sz="1200" i="1" kern="1200">
+                              <a:solidFill>
+                                <a:schemeClr val="tx1"/>
+                              </a:solidFill>
+                              <a:effectLst/>
+                              <a:latin typeface="Cambria Math" panose="02040503050406030204" pitchFamily="18" charset="0"/>
+                              <a:ea typeface="+mn-ea"/>
+                              <a:cs typeface="+mn-cs"/>
+                            </a:rPr>
+                            <m:t>𝑦</m:t>
+                          </m:r>
+                        </m:e>
+                        <m:sub>
+                          <m:r>
+                            <a:rPr lang="en-US" sz="1200" i="1" kern="1200">
+                              <a:solidFill>
+                                <a:schemeClr val="tx1"/>
+                              </a:solidFill>
+                              <a:effectLst/>
+                              <a:latin typeface="Cambria Math" panose="02040503050406030204" pitchFamily="18" charset="0"/>
+                              <a:ea typeface="+mn-ea"/>
+                              <a:cs typeface="+mn-cs"/>
+                            </a:rPr>
+                            <m:t>𝑝𝑖𝑝𝑒</m:t>
+                          </m:r>
+                          <m:r>
+                            <a:rPr lang="en-US" sz="1200" i="1" kern="1200">
+                              <a:solidFill>
+                                <a:schemeClr val="tx1"/>
+                              </a:solidFill>
+                              <a:effectLst/>
+                              <a:latin typeface="Cambria Math" panose="02040503050406030204" pitchFamily="18" charset="0"/>
+                              <a:ea typeface="+mn-ea"/>
+                              <a:cs typeface="+mn-cs"/>
+                            </a:rPr>
+                            <m:t>1</m:t>
+                          </m:r>
+                        </m:sub>
+                      </m:sSub>
+                      <m:r>
+                        <a:rPr lang="en-US" sz="1200" i="1" kern="1200">
+                          <a:solidFill>
+                            <a:schemeClr val="tx1"/>
+                          </a:solidFill>
+                          <a:effectLst/>
+                          <a:latin typeface="Cambria Math" panose="02040503050406030204" pitchFamily="18" charset="0"/>
+                          <a:ea typeface="+mn-ea"/>
+                          <a:cs typeface="+mn-cs"/>
+                        </a:rPr>
+                        <m:t>=</m:t>
+                      </m:r>
+                      <m:r>
+                        <a:rPr lang="en-US" sz="1200" i="1" kern="1200">
+                          <a:solidFill>
+                            <a:schemeClr val="tx1"/>
+                          </a:solidFill>
+                          <a:effectLst/>
+                          <a:latin typeface="Cambria Math" panose="02040503050406030204" pitchFamily="18" charset="0"/>
+                          <a:ea typeface="+mn-ea"/>
+                          <a:cs typeface="+mn-cs"/>
+                        </a:rPr>
+                        <m:t>3</m:t>
+                      </m:r>
+                      <m:r>
+                        <a:rPr lang="en-US" sz="1200" i="1" kern="1200">
+                          <a:solidFill>
+                            <a:schemeClr val="tx1"/>
+                          </a:solidFill>
+                          <a:effectLst/>
+                          <a:latin typeface="Cambria Math" panose="02040503050406030204" pitchFamily="18" charset="0"/>
+                          <a:ea typeface="+mn-ea"/>
+                          <a:cs typeface="+mn-cs"/>
+                        </a:rPr>
+                        <m:t>+</m:t>
+                      </m:r>
+                      <m:d>
+                        <m:dPr>
+                          <m:ctrlPr>
+                            <a:rPr lang="en-US" sz="1200" i="1" kern="1200">
+                              <a:solidFill>
+                                <a:schemeClr val="tx1"/>
+                              </a:solidFill>
+                              <a:effectLst/>
+                              <a:latin typeface="Cambria Math" panose="02040503050406030204" pitchFamily="18" charset="0"/>
+                              <a:ea typeface="+mn-ea"/>
+                              <a:cs typeface="+mn-cs"/>
+                            </a:rPr>
+                          </m:ctrlPr>
+                        </m:dPr>
+                        <m:e>
+                          <m:r>
+                            <a:rPr lang="en-US" sz="1200" i="1" kern="1200">
+                              <a:solidFill>
+                                <a:schemeClr val="tx1"/>
+                              </a:solidFill>
+                              <a:effectLst/>
+                              <a:latin typeface="Cambria Math" panose="02040503050406030204" pitchFamily="18" charset="0"/>
+                              <a:ea typeface="+mn-ea"/>
+                              <a:cs typeface="+mn-cs"/>
+                            </a:rPr>
+                            <m:t>𝑛𝑢𝑚𝑏𝑒𝑟</m:t>
+                          </m:r>
+                          <m:r>
+                            <a:rPr lang="en-US" sz="1200" i="1" kern="1200">
+                              <a:solidFill>
+                                <a:schemeClr val="tx1"/>
+                              </a:solidFill>
+                              <a:effectLst/>
+                              <a:latin typeface="Cambria Math" panose="02040503050406030204" pitchFamily="18" charset="0"/>
+                              <a:ea typeface="+mn-ea"/>
+                              <a:cs typeface="+mn-cs"/>
+                            </a:rPr>
+                            <m:t> </m:t>
+                          </m:r>
+                          <m:r>
+                            <a:rPr lang="en-US" sz="1200" i="1" kern="1200">
+                              <a:solidFill>
+                                <a:schemeClr val="tx1"/>
+                              </a:solidFill>
+                              <a:effectLst/>
+                              <a:latin typeface="Cambria Math" panose="02040503050406030204" pitchFamily="18" charset="0"/>
+                              <a:ea typeface="+mn-ea"/>
+                              <a:cs typeface="+mn-cs"/>
+                            </a:rPr>
+                            <m:t>𝑜𝑓</m:t>
+                          </m:r>
+                          <m:r>
+                            <a:rPr lang="en-US" sz="1200" i="1" kern="1200">
+                              <a:solidFill>
+                                <a:schemeClr val="tx1"/>
+                              </a:solidFill>
+                              <a:effectLst/>
+                              <a:latin typeface="Cambria Math" panose="02040503050406030204" pitchFamily="18" charset="0"/>
+                              <a:ea typeface="+mn-ea"/>
+                              <a:cs typeface="+mn-cs"/>
+                            </a:rPr>
+                            <m:t> </m:t>
+                          </m:r>
+                          <m:r>
+                            <a:rPr lang="en-US" sz="1200" i="1" kern="1200">
+                              <a:solidFill>
+                                <a:schemeClr val="tx1"/>
+                              </a:solidFill>
+                              <a:effectLst/>
+                              <a:latin typeface="Cambria Math" panose="02040503050406030204" pitchFamily="18" charset="0"/>
+                              <a:ea typeface="+mn-ea"/>
+                              <a:cs typeface="+mn-cs"/>
+                            </a:rPr>
+                            <m:t>𝑝𝑜𝑖𝑛𝑡𝑠</m:t>
+                          </m:r>
+                        </m:e>
+                      </m:d>
+                      <m:r>
+                        <a:rPr lang="en-US" sz="1200" i="1" kern="1200">
+                          <a:solidFill>
+                            <a:schemeClr val="tx1"/>
+                          </a:solidFill>
+                          <a:effectLst/>
+                          <a:latin typeface="Cambria Math" panose="02040503050406030204" pitchFamily="18" charset="0"/>
+                          <a:ea typeface="+mn-ea"/>
+                          <a:cs typeface="+mn-cs"/>
+                        </a:rPr>
+                        <m:t>+</m:t>
+                      </m:r>
+                      <m:r>
+                        <a:rPr lang="en-US" sz="1200" i="1" kern="1200">
+                          <a:solidFill>
+                            <a:schemeClr val="tx1"/>
+                          </a:solidFill>
+                          <a:effectLst/>
+                          <a:latin typeface="Cambria Math" panose="02040503050406030204" pitchFamily="18" charset="0"/>
+                          <a:ea typeface="+mn-ea"/>
+                          <a:cs typeface="+mn-cs"/>
+                        </a:rPr>
+                        <m:t>3</m:t>
+                      </m:r>
+                      <m:r>
+                        <a:rPr lang="en-US" sz="1200" i="1" kern="1200">
+                          <a:solidFill>
+                            <a:schemeClr val="tx1"/>
+                          </a:solidFill>
+                          <a:effectLst/>
+                          <a:latin typeface="Cambria Math" panose="02040503050406030204" pitchFamily="18" charset="0"/>
+                          <a:ea typeface="+mn-ea"/>
+                          <a:cs typeface="+mn-cs"/>
+                        </a:rPr>
+                        <m:t> [</m:t>
+                      </m:r>
+                      <m:r>
+                        <a:rPr lang="en-US" sz="1200" i="1" kern="1200">
+                          <a:solidFill>
+                            <a:schemeClr val="tx1"/>
+                          </a:solidFill>
+                          <a:effectLst/>
+                          <a:latin typeface="Cambria Math" panose="02040503050406030204" pitchFamily="18" charset="0"/>
+                          <a:ea typeface="+mn-ea"/>
+                          <a:cs typeface="+mn-cs"/>
+                        </a:rPr>
+                        <m:t>𝑐𝑙𝑜𝑐𝑘</m:t>
+                      </m:r>
+                      <m:r>
+                        <a:rPr lang="en-US" sz="1200" i="1" kern="1200">
+                          <a:solidFill>
+                            <a:schemeClr val="tx1"/>
+                          </a:solidFill>
+                          <a:effectLst/>
+                          <a:latin typeface="Cambria Math" panose="02040503050406030204" pitchFamily="18" charset="0"/>
+                          <a:ea typeface="+mn-ea"/>
+                          <a:cs typeface="+mn-cs"/>
+                        </a:rPr>
+                        <m:t> </m:t>
+                      </m:r>
+                      <m:r>
+                        <a:rPr lang="en-US" sz="1200" i="1" kern="1200">
+                          <a:solidFill>
+                            <a:schemeClr val="tx1"/>
+                          </a:solidFill>
+                          <a:effectLst/>
+                          <a:latin typeface="Cambria Math" panose="02040503050406030204" pitchFamily="18" charset="0"/>
+                          <a:ea typeface="+mn-ea"/>
+                          <a:cs typeface="+mn-cs"/>
+                        </a:rPr>
+                        <m:t>𝑐𝑦𝑐𝑙𝑒𝑠</m:t>
+                      </m:r>
+                      <m:r>
+                        <a:rPr lang="en-US" sz="1200" i="1" kern="1200">
+                          <a:solidFill>
+                            <a:schemeClr val="tx1"/>
+                          </a:solidFill>
+                          <a:effectLst/>
+                          <a:latin typeface="Cambria Math" panose="02040503050406030204" pitchFamily="18" charset="0"/>
+                          <a:ea typeface="+mn-ea"/>
+                          <a:cs typeface="+mn-cs"/>
+                        </a:rPr>
+                        <m:t>]</m:t>
+                      </m:r>
+                    </m:oMath>
+                  </m:oMathPara>
+                </a14:m>
+                <a:endParaRPr lang="en-US" sz="1200" kern="1200" dirty="0">
+                  <a:solidFill>
+                    <a:schemeClr val="tx1"/>
+                  </a:solidFill>
+                  <a:effectLst/>
+                  <a:latin typeface="+mn-lt"/>
+                  <a:ea typeface="+mn-ea"/>
+                  <a:cs typeface="+mn-cs"/>
+                </a:endParaRPr>
+              </a:p>
+              <a:p>
+                <a:endParaRPr lang="en-US" dirty="0"/>
+              </a:p>
+            </p:txBody>
+          </p:sp>
+        </mc:Choice>
+        <mc:Fallback xmlns="">
+          <p:sp>
+            <p:nvSpPr>
+              <p:cNvPr id="3" name="Notes Placeholder 2"/>
+              <p:cNvSpPr>
+                <a:spLocks noGrp="1"/>
+              </p:cNvSpPr>
+              <p:nvPr>
+                <p:ph type="body" idx="1"/>
+              </p:nvPr>
+            </p:nvSpPr>
+            <p:spPr/>
+            <p:txBody>
+              <a:bodyPr/>
+              <a:lstStyle/>
+              <a:p>
+                <a:endParaRPr lang="en-US" sz="1200" i="1" kern="1200" dirty="0">
+                  <a:solidFill>
+                    <a:schemeClr val="tx1"/>
+                  </a:solidFill>
+                  <a:effectLst/>
+                  <a:latin typeface="+mn-lt"/>
+                  <a:ea typeface="+mn-ea"/>
+                  <a:cs typeface="+mn-cs"/>
+                </a:endParaRPr>
+              </a:p>
+              <a:p>
+                <a:pPr marL="0" marR="0" lvl="0" indent="0" algn="r" defTabSz="914400" rtl="1" eaLnBrk="1" fontAlgn="auto" latinLnBrk="0" hangingPunct="1">
+                  <a:lnSpc>
+                    <a:spcPct val="100000"/>
+                  </a:lnSpc>
+                  <a:spcBef>
+                    <a:spcPts val="0"/>
+                  </a:spcBef>
+                  <a:spcAft>
+                    <a:spcPts val="0"/>
+                  </a:spcAft>
+                  <a:buClrTx/>
+                  <a:buSzTx/>
+                  <a:buFontTx/>
+                  <a:buNone/>
+                  <a:tabLst/>
+                  <a:defRPr/>
+                </a:pPr>
+                <a:r>
+                  <a:rPr lang="en-US" dirty="0">
+                    <a:latin typeface="Calibri" panose="020F0502020204030204" pitchFamily="34" charset="0"/>
+                    <a:ea typeface="Calibri" panose="020F0502020204030204" pitchFamily="34" charset="0"/>
+                    <a:cs typeface="Arial" panose="020B0604020202020204" pitchFamily="34" charset="0"/>
+                  </a:rPr>
+                  <a:t> Three clock cycles are needed to fill this module pipeline. </a:t>
+                </a:r>
+                <a:r>
+                  <a:rPr lang="en-US" dirty="0"/>
+                  <a:t>After the pipeline is filled, every clock cycle a new point is classified. As the final data point enters the pipeline, it must go thought the pipeline stages, hence three more clock cycles are needed to complete the classification block functionality.</a:t>
+                </a:r>
+              </a:p>
+              <a:p>
+                <a:endParaRPr lang="en-US" sz="1200" i="1" kern="1200" dirty="0">
+                  <a:solidFill>
+                    <a:schemeClr val="tx1"/>
+                  </a:solidFill>
+                  <a:effectLst/>
+                  <a:latin typeface="+mn-lt"/>
+                  <a:ea typeface="+mn-ea"/>
+                  <a:cs typeface="+mn-cs"/>
+                </a:endParaRPr>
+              </a:p>
+              <a:p>
+                <a:r>
+                  <a:rPr lang="en-US" sz="1200" i="0" kern="1200">
+                    <a:solidFill>
+                      <a:schemeClr val="tx1"/>
+                    </a:solidFill>
+                    <a:effectLst/>
+                    <a:latin typeface="+mn-lt"/>
+                    <a:ea typeface="+mn-ea"/>
+                    <a:cs typeface="+mn-cs"/>
+                  </a:rPr>
+                  <a:t>𝑙𝑎𝑡𝑒𝑛𝑐𝑦_𝑝𝑖𝑝𝑒1=3+(𝑛𝑢𝑚𝑏𝑒𝑟 𝑜𝑓 𝑝𝑜𝑖𝑛𝑡𝑠)+3 [𝑐𝑙𝑜𝑐𝑘 𝑐𝑦𝑐𝑙𝑒𝑠]</a:t>
+                </a:r>
+                <a:endParaRPr lang="en-US" sz="1200" kern="1200" dirty="0">
+                  <a:solidFill>
+                    <a:schemeClr val="tx1"/>
+                  </a:solidFill>
+                  <a:effectLst/>
+                  <a:latin typeface="+mn-lt"/>
+                  <a:ea typeface="+mn-ea"/>
+                  <a:cs typeface="+mn-cs"/>
+                </a:endParaRPr>
+              </a:p>
+              <a:p>
+                <a:endParaRPr lang="en-US" dirty="0"/>
+              </a:p>
+            </p:txBody>
+          </p:sp>
+        </mc:Fallback>
+      </mc:AlternateContent>
+      <p:sp>
+        <p:nvSpPr>
+          <p:cNvPr id="4" name="Slide Number Placeholder 3"/>
           <p:cNvSpPr>
             <a:spLocks noGrp="1"/>
           </p:cNvSpPr>
           <p:nvPr>
-            <p:ph type="body" idx="1"/>
+            <p:ph type="sldNum" sz="quarter" idx="5"/>
           </p:nvPr>
         </p:nvSpPr>
         <p:spPr/>
@@ -1996,51 +1931,9 @@
           <a:bodyPr/>
           <a:lstStyle/>
           <a:p>
-            <a:pPr marL="0" marR="0" lvl="0" indent="0" algn="r" defTabSz="914400" rtl="1" eaLnBrk="1" fontAlgn="auto" latinLnBrk="0" hangingPunct="1">
-              <a:lnSpc>
-                <a:spcPct val="100000"/>
-              </a:lnSpc>
-              <a:spcBef>
-                <a:spcPts val="0"/>
-              </a:spcBef>
-              <a:spcAft>
-                <a:spcPts val="0"/>
-              </a:spcAft>
-              <a:buClrTx/>
-              <a:buSzTx/>
-              <a:buFontTx/>
-              <a:buNone/>
-              <a:tabLst/>
-              <a:defRPr/>
-            </a:pPr>
-            <a:r>
-              <a:rPr lang="en-US" dirty="0"/>
-              <a:t>The latency of the second pipeline eight times the number of cycle to calculate the division for the new centroid(2), plus the number of cycles to check the convergence of a centroid(1), and at the one extra cycle at the end:</a:t>
-            </a:r>
-          </a:p>
-          <a:p>
-            <a:endParaRPr lang="en-US" dirty="0"/>
-          </a:p>
-        </p:txBody>
-      </p:sp>
-      <p:sp>
-        <p:nvSpPr>
-          <p:cNvPr id="4" name="Slide Number Placeholder 3"/>
-          <p:cNvSpPr>
-            <a:spLocks noGrp="1"/>
-          </p:cNvSpPr>
-          <p:nvPr>
-            <p:ph type="sldNum" sz="quarter" idx="5"/>
-          </p:nvPr>
-        </p:nvSpPr>
-        <p:spPr/>
-        <p:txBody>
-          <a:bodyPr/>
-          <a:lstStyle/>
-          <a:p>
             <a:fld id="{A47A8C64-5C8B-40B3-A683-36C8893A9F2F}" type="slidenum">
               <a:rPr lang="he-IL" smtClean="0"/>
-              <a:t>26</a:t>
+              <a:t>25</a:t>
             </a:fld>
             <a:endParaRPr lang="he-IL"/>
           </a:p>
@@ -2049,7 +1942,7 @@
     </p:spTree>
     <p:extLst>
       <p:ext uri="{BB962C8B-B14F-4D97-AF65-F5344CB8AC3E}">
-        <p14:creationId xmlns:p14="http://schemas.microsoft.com/office/powerpoint/2010/main" val="3370957317"/>
+        <p14:creationId xmlns:p14="http://schemas.microsoft.com/office/powerpoint/2010/main" val="1663352089"/>
       </p:ext>
     </p:extLst>
   </p:cSld>
@@ -2059,7 +1952,7 @@
 </p:notes>
 </file>
 
-<file path=ppt/notesSlides/notesSlide13.xml><?xml version="1.0" encoding="utf-8"?>
+<file path=ppt/notesSlides/notesSlide12.xml><?xml version="1.0" encoding="utf-8"?>
 <p:notes xmlns:a="http://schemas.openxmlformats.org/drawingml/2006/main" xmlns:r="http://schemas.openxmlformats.org/officeDocument/2006/relationships" xmlns:p="http://schemas.openxmlformats.org/presentationml/2006/main">
   <p:cSld>
     <p:spTree>
@@ -2688,7 +2581,7 @@
           <a:p>
             <a:fld id="{A47A8C64-5C8B-40B3-A683-36C8893A9F2F}" type="slidenum">
               <a:rPr lang="he-IL" smtClean="0"/>
-              <a:t>27</a:t>
+              <a:t>26</a:t>
             </a:fld>
             <a:endParaRPr lang="he-IL"/>
           </a:p>
@@ -2698,6 +2591,113 @@
     <p:extLst>
       <p:ext uri="{BB962C8B-B14F-4D97-AF65-F5344CB8AC3E}">
         <p14:creationId xmlns:p14="http://schemas.microsoft.com/office/powerpoint/2010/main" val="3623322444"/>
+      </p:ext>
+    </p:extLst>
+  </p:cSld>
+  <p:clrMapOvr>
+    <a:masterClrMapping/>
+  </p:clrMapOvr>
+</p:notes>
+</file>
+
+<file path=ppt/notesSlides/notesSlide13.xml><?xml version="1.0" encoding="utf-8"?>
+<p:notes xmlns:a="http://schemas.openxmlformats.org/drawingml/2006/main" xmlns:r="http://schemas.openxmlformats.org/officeDocument/2006/relationships" xmlns:p="http://schemas.openxmlformats.org/presentationml/2006/main">
+  <p:cSld>
+    <p:spTree>
+      <p:nvGrpSpPr>
+        <p:cNvPr id="1" name=""/>
+        <p:cNvGrpSpPr/>
+        <p:nvPr/>
+      </p:nvGrpSpPr>
+      <p:grpSpPr>
+        <a:xfrm>
+          <a:off x="0" y="0"/>
+          <a:ext cx="0" cy="0"/>
+          <a:chOff x="0" y="0"/>
+          <a:chExt cx="0" cy="0"/>
+        </a:xfrm>
+      </p:grpSpPr>
+      <p:sp>
+        <p:nvSpPr>
+          <p:cNvPr id="2" name="Slide Image Placeholder 1"/>
+          <p:cNvSpPr>
+            <a:spLocks noGrp="1" noRot="1" noChangeAspect="1"/>
+          </p:cNvSpPr>
+          <p:nvPr>
+            <p:ph type="sldImg"/>
+          </p:nvPr>
+        </p:nvSpPr>
+        <p:spPr/>
+      </p:sp>
+      <p:sp>
+        <p:nvSpPr>
+          <p:cNvPr id="3" name="Notes Placeholder 2"/>
+          <p:cNvSpPr>
+            <a:spLocks noGrp="1"/>
+          </p:cNvSpPr>
+          <p:nvPr>
+            <p:ph type="body" idx="1"/>
+          </p:nvPr>
+        </p:nvSpPr>
+        <p:spPr/>
+        <p:txBody>
+          <a:bodyPr/>
+          <a:lstStyle/>
+          <a:p>
+            <a:pPr marL="0" marR="0" lvl="0" indent="0" algn="r" defTabSz="914400" rtl="1" eaLnBrk="1" fontAlgn="auto" latinLnBrk="0" hangingPunct="1">
+              <a:lnSpc>
+                <a:spcPct val="100000"/>
+              </a:lnSpc>
+              <a:spcBef>
+                <a:spcPts val="0"/>
+              </a:spcBef>
+              <a:spcAft>
+                <a:spcPts val="0"/>
+              </a:spcAft>
+              <a:buClrTx/>
+              <a:buSzTx/>
+              <a:buFontTx/>
+              <a:buNone/>
+              <a:tabLst/>
+              <a:defRPr/>
+            </a:pPr>
+            <a:r>
+              <a:rPr lang="en-US" dirty="0"/>
+              <a:t>The latency of the second pipeline eight times the number of cycle to calculate the division for the new centroid(2), plus the number of cycles to check the convergence of a centroid(1), and at the one extra cycle at the end:</a:t>
+            </a:r>
+          </a:p>
+          <a:p>
+            <a:endParaRPr lang="en-US" dirty="0"/>
+          </a:p>
+        </p:txBody>
+      </p:sp>
+      <p:sp>
+        <p:nvSpPr>
+          <p:cNvPr id="4" name="Slide Number Placeholder 3"/>
+          <p:cNvSpPr>
+            <a:spLocks noGrp="1"/>
+          </p:cNvSpPr>
+          <p:nvPr>
+            <p:ph type="sldNum" sz="quarter" idx="5"/>
+          </p:nvPr>
+        </p:nvSpPr>
+        <p:spPr/>
+        <p:txBody>
+          <a:bodyPr/>
+          <a:lstStyle/>
+          <a:p>
+            <a:fld id="{A47A8C64-5C8B-40B3-A683-36C8893A9F2F}" type="slidenum">
+              <a:rPr lang="he-IL" smtClean="0"/>
+              <a:t>27</a:t>
+            </a:fld>
+            <a:endParaRPr lang="he-IL"/>
+          </a:p>
+        </p:txBody>
+      </p:sp>
+    </p:spTree>
+    <p:extLst>
+      <p:ext uri="{BB962C8B-B14F-4D97-AF65-F5344CB8AC3E}">
+        <p14:creationId xmlns:p14="http://schemas.microsoft.com/office/powerpoint/2010/main" val="3370957317"/>
       </p:ext>
     </p:extLst>
   </p:cSld>
@@ -4805,7 +4805,7 @@
           <a:p>
             <a:fld id="{48A87A34-81AB-432B-8DAE-1953F412C126}" type="datetimeFigureOut">
               <a:rPr lang="en-US" smtClean="0"/>
-              <a:t>6/18/2020</a:t>
+              <a:t>6/21/2020</a:t>
             </a:fld>
             <a:endParaRPr lang="en-US" dirty="0"/>
           </a:p>
@@ -5003,7 +5003,7 @@
           <a:p>
             <a:fld id="{48A87A34-81AB-432B-8DAE-1953F412C126}" type="datetimeFigureOut">
               <a:rPr lang="en-US" smtClean="0"/>
-              <a:t>6/18/2020</a:t>
+              <a:t>6/21/2020</a:t>
             </a:fld>
             <a:endParaRPr lang="en-US" dirty="0"/>
           </a:p>
@@ -5211,7 +5211,7 @@
           <a:p>
             <a:fld id="{48A87A34-81AB-432B-8DAE-1953F412C126}" type="datetimeFigureOut">
               <a:rPr lang="en-US" smtClean="0"/>
-              <a:t>6/18/2020</a:t>
+              <a:t>6/21/2020</a:t>
             </a:fld>
             <a:endParaRPr lang="en-US" dirty="0"/>
           </a:p>
@@ -5409,7 +5409,7 @@
           <a:p>
             <a:fld id="{48A87A34-81AB-432B-8DAE-1953F412C126}" type="datetimeFigureOut">
               <a:rPr lang="en-US" smtClean="0"/>
-              <a:t>6/18/2020</a:t>
+              <a:t>6/21/2020</a:t>
             </a:fld>
             <a:endParaRPr lang="en-US" dirty="0"/>
           </a:p>
@@ -5684,7 +5684,7 @@
           <a:p>
             <a:fld id="{48A87A34-81AB-432B-8DAE-1953F412C126}" type="datetimeFigureOut">
               <a:rPr lang="en-US" smtClean="0"/>
-              <a:t>6/18/2020</a:t>
+              <a:t>6/21/2020</a:t>
             </a:fld>
             <a:endParaRPr lang="en-US" dirty="0"/>
           </a:p>
@@ -5949,7 +5949,7 @@
           <a:p>
             <a:fld id="{48A87A34-81AB-432B-8DAE-1953F412C126}" type="datetimeFigureOut">
               <a:rPr lang="en-US" smtClean="0"/>
-              <a:t>6/18/2020</a:t>
+              <a:t>6/21/2020</a:t>
             </a:fld>
             <a:endParaRPr lang="en-US" dirty="0"/>
           </a:p>
@@ -6361,7 +6361,7 @@
           <a:p>
             <a:fld id="{48A87A34-81AB-432B-8DAE-1953F412C126}" type="datetimeFigureOut">
               <a:rPr lang="en-US" smtClean="0"/>
-              <a:t>6/18/2020</a:t>
+              <a:t>6/21/2020</a:t>
             </a:fld>
             <a:endParaRPr lang="en-US" dirty="0"/>
           </a:p>
@@ -6502,7 +6502,7 @@
           <a:p>
             <a:fld id="{48A87A34-81AB-432B-8DAE-1953F412C126}" type="datetimeFigureOut">
               <a:rPr lang="en-US" smtClean="0"/>
-              <a:t>6/18/2020</a:t>
+              <a:t>6/21/2020</a:t>
             </a:fld>
             <a:endParaRPr lang="en-US" dirty="0"/>
           </a:p>
@@ -6615,7 +6615,7 @@
           <a:p>
             <a:fld id="{48A87A34-81AB-432B-8DAE-1953F412C126}" type="datetimeFigureOut">
               <a:rPr lang="en-US" smtClean="0"/>
-              <a:t>6/18/2020</a:t>
+              <a:t>6/21/2020</a:t>
             </a:fld>
             <a:endParaRPr lang="en-US" dirty="0"/>
           </a:p>
@@ -6926,7 +6926,7 @@
           <a:p>
             <a:fld id="{48A87A34-81AB-432B-8DAE-1953F412C126}" type="datetimeFigureOut">
               <a:rPr lang="en-US" smtClean="0"/>
-              <a:t>6/18/2020</a:t>
+              <a:t>6/21/2020</a:t>
             </a:fld>
             <a:endParaRPr lang="en-US" dirty="0"/>
           </a:p>
@@ -7214,7 +7214,7 @@
           <a:p>
             <a:fld id="{48A87A34-81AB-432B-8DAE-1953F412C126}" type="datetimeFigureOut">
               <a:rPr lang="en-US" smtClean="0"/>
-              <a:t>6/18/2020</a:t>
+              <a:t>6/21/2020</a:t>
             </a:fld>
             <a:endParaRPr lang="en-US" dirty="0"/>
           </a:p>
@@ -7456,7 +7456,7 @@
             <a:fld id="{48A87A34-81AB-432B-8DAE-1953F412C126}" type="datetimeFigureOut">
               <a:rPr lang="en-US" smtClean="0"/>
               <a:pPr/>
-              <a:t>6/18/2020</a:t>
+              <a:t>6/21/2020</a:t>
             </a:fld>
             <a:endParaRPr lang="en-US" dirty="0"/>
           </a:p>
@@ -7918,10 +7918,15 @@
             <p:ph type="subTitle" idx="1"/>
           </p:nvPr>
         </p:nvSpPr>
-        <p:spPr/>
+        <p:spPr>
+          <a:xfrm>
+            <a:off x="1523999" y="3602037"/>
+            <a:ext cx="9381067" cy="1918229"/>
+          </a:xfrm>
+        </p:spPr>
         <p:txBody>
           <a:bodyPr>
-            <a:normAutofit fontScale="77500" lnSpcReduction="20000"/>
+            <a:normAutofit fontScale="70000" lnSpcReduction="20000"/>
           </a:bodyPr>
           <a:lstStyle/>
           <a:p>
@@ -7939,8 +7944,15 @@
           <a:p>
             <a:r>
               <a:rPr lang="en-US" dirty="0"/>
-              <a:t>Eddy Sraiber</a:t>
-            </a:r>
+              <a:t>Eddy </a:t>
+            </a:r>
+            <a:r>
+              <a:rPr lang="en-US" dirty="0" err="1"/>
+              <a:t>Sraiber</a:t>
+            </a:r>
+            <a:endParaRPr lang="en-US" dirty="0"/>
+          </a:p>
+          <a:p>
             <a:endParaRPr lang="he-IL" dirty="0"/>
           </a:p>
           <a:p>
@@ -10121,7 +10133,7 @@
         </p:spPr>
         <p:txBody>
           <a:bodyPr>
-            <a:normAutofit fontScale="55000" lnSpcReduction="20000"/>
+            <a:normAutofit fontScale="62500" lnSpcReduction="20000"/>
           </a:bodyPr>
           <a:lstStyle/>
           <a:p>
@@ -10146,12 +10158,6 @@
             <a:r>
               <a:rPr lang="en-US" dirty="0"/>
               <a:t>Introduction to APB protocol</a:t>
-            </a:r>
-          </a:p>
-          <a:p>
-            <a:r>
-              <a:rPr lang="en-US" dirty="0"/>
-              <a:t>Introduction to the paper</a:t>
             </a:r>
           </a:p>
           <a:p>
@@ -10928,6 +10934,457 @@
 </file>
 
 <file path=ppt/slides/slide24.xml><?xml version="1.0" encoding="utf-8"?>
+<p:sld xmlns:a="http://schemas.openxmlformats.org/drawingml/2006/main" xmlns:r="http://schemas.openxmlformats.org/officeDocument/2006/relationships" xmlns:p="http://schemas.openxmlformats.org/presentationml/2006/main">
+  <p:cSld>
+    <p:spTree>
+      <p:nvGrpSpPr>
+        <p:cNvPr id="1" name=""/>
+        <p:cNvGrpSpPr/>
+        <p:nvPr/>
+      </p:nvGrpSpPr>
+      <p:grpSpPr>
+        <a:xfrm>
+          <a:off x="0" y="0"/>
+          <a:ext cx="0" cy="0"/>
+          <a:chOff x="0" y="0"/>
+          <a:chExt cx="0" cy="0"/>
+        </a:xfrm>
+      </p:grpSpPr>
+      <mc:AlternateContent xmlns:mc="http://schemas.openxmlformats.org/markup-compatibility/2006" xmlns:a14="http://schemas.microsoft.com/office/drawing/2010/main">
+        <mc:Choice Requires="a14">
+          <p:sp>
+            <p:nvSpPr>
+              <p:cNvPr id="3" name="מציין מיקום תוכן 2">
+                <a:extLst>
+                  <a:ext uri="{FF2B5EF4-FFF2-40B4-BE49-F238E27FC236}">
+                    <a16:creationId xmlns:a16="http://schemas.microsoft.com/office/drawing/2014/main" id="{175841C0-4F8E-41BA-AF63-B983C98C91CF}"/>
+                  </a:ext>
+                </a:extLst>
+              </p:cNvPr>
+              <p:cNvSpPr>
+                <a:spLocks noGrp="1"/>
+              </p:cNvSpPr>
+              <p:nvPr>
+                <p:ph idx="1"/>
+              </p:nvPr>
+            </p:nvSpPr>
+            <p:spPr>
+              <a:xfrm>
+                <a:off x="915202" y="2181760"/>
+                <a:ext cx="10515600" cy="4351338"/>
+              </a:xfrm>
+            </p:spPr>
+            <p:txBody>
+              <a:bodyPr>
+                <a:normAutofit/>
+              </a:bodyPr>
+              <a:lstStyle/>
+              <a:p>
+                <a:r>
+                  <a:rPr lang="en-US" sz="2000" dirty="0"/>
+                  <a:t>Three clock cycles are needed to fill this module pipeline.</a:t>
+                </a:r>
+              </a:p>
+              <a:p>
+                <a:r>
+                  <a:rPr lang="en-US" sz="2000" dirty="0"/>
+                  <a:t>After the pipeline is filled, every clock cycle a new point is classified.</a:t>
+                </a:r>
+              </a:p>
+              <a:p>
+                <a:r>
+                  <a:rPr lang="en-US" sz="2000" dirty="0"/>
+                  <a:t>So the throughput  is of one new point classification per cycle. </a:t>
+                </a:r>
+              </a:p>
+              <a:p>
+                <a:r>
+                  <a:rPr lang="en-US" sz="2000" dirty="0"/>
+                  <a:t>The bandwidth therefore can be calculated as the point size in Bytes per clock cycle.</a:t>
+                </a:r>
+              </a:p>
+              <a:p>
+                <a:r>
+                  <a:rPr lang="en-US" sz="2000" dirty="0"/>
+                  <a:t>For example, if the used clock has a 100 </a:t>
+                </a:r>
+                <a:r>
+                  <a:rPr lang="en-US" sz="2000" dirty="0" err="1"/>
+                  <a:t>Mhz</a:t>
+                </a:r>
+                <a:r>
+                  <a:rPr lang="en-US" sz="2000" dirty="0"/>
+                  <a:t> frequency, the block’s bandwidth is as described below:</a:t>
+                </a:r>
+              </a:p>
+              <a:p>
+                <a:pPr marL="0" indent="0">
+                  <a:buNone/>
+                </a:pPr>
+                <a:r>
+                  <a:rPr lang="en-US" sz="2000" dirty="0"/>
+                  <a:t>	</a:t>
+                </a:r>
+                <a14:m>
+                  <m:oMath xmlns:m="http://schemas.openxmlformats.org/officeDocument/2006/math">
+                    <m:r>
+                      <a:rPr lang="en-US" sz="2000" i="1">
+                        <a:latin typeface="Cambria Math" panose="02040503050406030204" pitchFamily="18" charset="0"/>
+                      </a:rPr>
+                      <m:t>𝑏𝑎𝑛𝑑𝑤𝑖𝑑𝑡</m:t>
+                    </m:r>
+                    <m:sSub>
+                      <m:sSubPr>
+                        <m:ctrlPr>
+                          <a:rPr lang="en-US" sz="2000" i="1">
+                            <a:latin typeface="Cambria Math" panose="02040503050406030204" pitchFamily="18" charset="0"/>
+                          </a:rPr>
+                        </m:ctrlPr>
+                      </m:sSubPr>
+                      <m:e>
+                        <m:r>
+                          <a:rPr lang="en-US" sz="2000" i="1">
+                            <a:latin typeface="Cambria Math" panose="02040503050406030204" pitchFamily="18" charset="0"/>
+                          </a:rPr>
+                          <m:t>h</m:t>
+                        </m:r>
+                      </m:e>
+                      <m:sub>
+                        <m:r>
+                          <a:rPr lang="en-US" sz="2000" i="1">
+                            <a:latin typeface="Cambria Math" panose="02040503050406030204" pitchFamily="18" charset="0"/>
+                          </a:rPr>
+                          <m:t>𝑝𝑖𝑝𝑒</m:t>
+                        </m:r>
+                        <m:r>
+                          <a:rPr lang="en-US" sz="2000" i="1">
+                            <a:latin typeface="Cambria Math" panose="02040503050406030204" pitchFamily="18" charset="0"/>
+                          </a:rPr>
+                          <m:t>1</m:t>
+                        </m:r>
+                      </m:sub>
+                    </m:sSub>
+                    <m:r>
+                      <a:rPr lang="en-US" sz="2000" i="1">
+                        <a:latin typeface="Cambria Math" panose="02040503050406030204" pitchFamily="18" charset="0"/>
+                      </a:rPr>
+                      <m:t>=</m:t>
+                    </m:r>
+                    <m:f>
+                      <m:fPr>
+                        <m:ctrlPr>
+                          <a:rPr lang="en-US" sz="2000" i="1">
+                            <a:latin typeface="Cambria Math" panose="02040503050406030204" pitchFamily="18" charset="0"/>
+                          </a:rPr>
+                        </m:ctrlPr>
+                      </m:fPr>
+                      <m:num>
+                        <m:r>
+                          <a:rPr lang="en-US" sz="2000" i="1">
+                            <a:latin typeface="Cambria Math" panose="02040503050406030204" pitchFamily="18" charset="0"/>
+                          </a:rPr>
+                          <m:t>91</m:t>
+                        </m:r>
+                        <m:r>
+                          <a:rPr lang="en-US" sz="2000" i="1">
+                            <a:latin typeface="Cambria Math" panose="02040503050406030204" pitchFamily="18" charset="0"/>
+                          </a:rPr>
+                          <m:t>𝑏𝑖𝑡𝑠</m:t>
+                        </m:r>
+                      </m:num>
+                      <m:den>
+                        <m:r>
+                          <a:rPr lang="en-US" sz="2000" i="1">
+                            <a:latin typeface="Cambria Math" panose="02040503050406030204" pitchFamily="18" charset="0"/>
+                          </a:rPr>
+                          <m:t>5</m:t>
+                        </m:r>
+                        <m:r>
+                          <a:rPr lang="en-US" sz="2000" i="1">
+                            <a:latin typeface="Cambria Math" panose="02040503050406030204" pitchFamily="18" charset="0"/>
+                          </a:rPr>
+                          <m:t> </m:t>
+                        </m:r>
+                        <m:r>
+                          <a:rPr lang="en-US" sz="2000" i="1">
+                            <a:latin typeface="Cambria Math" panose="02040503050406030204" pitchFamily="18" charset="0"/>
+                          </a:rPr>
+                          <m:t>𝑛𝑠𝑒𝑐𝑠</m:t>
+                        </m:r>
+                      </m:den>
+                    </m:f>
+                    <m:r>
+                      <a:rPr lang="en-US" sz="2000" i="1">
+                        <a:latin typeface="Cambria Math" panose="02040503050406030204" pitchFamily="18" charset="0"/>
+                      </a:rPr>
+                      <m:t>=</m:t>
+                    </m:r>
+                    <m:f>
+                      <m:fPr>
+                        <m:ctrlPr>
+                          <a:rPr lang="en-US" sz="2000" i="1">
+                            <a:latin typeface="Cambria Math" panose="02040503050406030204" pitchFamily="18" charset="0"/>
+                          </a:rPr>
+                        </m:ctrlPr>
+                      </m:fPr>
+                      <m:num>
+                        <m:r>
+                          <a:rPr lang="en-US" sz="2000" i="1">
+                            <a:latin typeface="Cambria Math" panose="02040503050406030204" pitchFamily="18" charset="0"/>
+                          </a:rPr>
+                          <m:t>11</m:t>
+                        </m:r>
+                        <m:r>
+                          <a:rPr lang="en-US" sz="2000" i="1">
+                            <a:latin typeface="Cambria Math" panose="02040503050406030204" pitchFamily="18" charset="0"/>
+                          </a:rPr>
+                          <m:t>.</m:t>
+                        </m:r>
+                        <m:r>
+                          <a:rPr lang="en-US" sz="2000" i="1">
+                            <a:latin typeface="Cambria Math" panose="02040503050406030204" pitchFamily="18" charset="0"/>
+                          </a:rPr>
+                          <m:t>375</m:t>
+                        </m:r>
+                        <m:r>
+                          <a:rPr lang="en-US" sz="2000" i="1">
+                            <a:latin typeface="Cambria Math" panose="02040503050406030204" pitchFamily="18" charset="0"/>
+                          </a:rPr>
+                          <m:t> </m:t>
+                        </m:r>
+                        <m:r>
+                          <a:rPr lang="en-US" sz="2000" i="1">
+                            <a:latin typeface="Cambria Math" panose="02040503050406030204" pitchFamily="18" charset="0"/>
+                          </a:rPr>
+                          <m:t>𝐵𝑦𝑡𝑒𝑠</m:t>
+                        </m:r>
+                      </m:num>
+                      <m:den>
+                        <m:r>
+                          <a:rPr lang="en-US" sz="2000" i="1">
+                            <a:latin typeface="Cambria Math" panose="02040503050406030204" pitchFamily="18" charset="0"/>
+                          </a:rPr>
+                          <m:t>5</m:t>
+                        </m:r>
+                        <m:r>
+                          <a:rPr lang="en-US" sz="2000" i="1">
+                            <a:latin typeface="Cambria Math" panose="02040503050406030204" pitchFamily="18" charset="0"/>
+                          </a:rPr>
+                          <m:t> </m:t>
+                        </m:r>
+                        <m:r>
+                          <a:rPr lang="en-US" sz="2000" i="1">
+                            <a:latin typeface="Cambria Math" panose="02040503050406030204" pitchFamily="18" charset="0"/>
+                          </a:rPr>
+                          <m:t>𝑛𝑠𝑒𝑐𝑠</m:t>
+                        </m:r>
+                      </m:den>
+                    </m:f>
+                    <m:r>
+                      <a:rPr lang="en-US" sz="2000" i="1">
+                        <a:latin typeface="Cambria Math" panose="02040503050406030204" pitchFamily="18" charset="0"/>
+                      </a:rPr>
+                      <m:t>=</m:t>
+                    </m:r>
+                    <m:r>
+                      <a:rPr lang="en-US" sz="2000" i="1">
+                        <a:latin typeface="Cambria Math" panose="02040503050406030204" pitchFamily="18" charset="0"/>
+                      </a:rPr>
+                      <m:t>2</m:t>
+                    </m:r>
+                    <m:r>
+                      <a:rPr lang="en-US" sz="2000" i="1">
+                        <a:latin typeface="Cambria Math" panose="02040503050406030204" pitchFamily="18" charset="0"/>
+                      </a:rPr>
+                      <m:t>.</m:t>
+                    </m:r>
+                    <m:r>
+                      <a:rPr lang="en-US" sz="2000" i="1">
+                        <a:latin typeface="Cambria Math" panose="02040503050406030204" pitchFamily="18" charset="0"/>
+                      </a:rPr>
+                      <m:t>275</m:t>
+                    </m:r>
+                    <m:r>
+                      <a:rPr lang="en-US" sz="2000" i="1">
+                        <a:latin typeface="Cambria Math" panose="02040503050406030204" pitchFamily="18" charset="0"/>
+                      </a:rPr>
+                      <m:t> </m:t>
+                    </m:r>
+                    <m:d>
+                      <m:dPr>
+                        <m:begChr m:val="["/>
+                        <m:endChr m:val="]"/>
+                        <m:ctrlPr>
+                          <a:rPr lang="en-US" sz="2000" i="1">
+                            <a:latin typeface="Cambria Math" panose="02040503050406030204" pitchFamily="18" charset="0"/>
+                          </a:rPr>
+                        </m:ctrlPr>
+                      </m:dPr>
+                      <m:e>
+                        <m:f>
+                          <m:fPr>
+                            <m:ctrlPr>
+                              <a:rPr lang="en-US" sz="2000" i="1">
+                                <a:latin typeface="Cambria Math" panose="02040503050406030204" pitchFamily="18" charset="0"/>
+                              </a:rPr>
+                            </m:ctrlPr>
+                          </m:fPr>
+                          <m:num>
+                            <m:r>
+                              <a:rPr lang="en-US" sz="2000" i="1">
+                                <a:latin typeface="Cambria Math" panose="02040503050406030204" pitchFamily="18" charset="0"/>
+                              </a:rPr>
+                              <m:t>𝑀𝐵</m:t>
+                            </m:r>
+                          </m:num>
+                          <m:den>
+                            <m:r>
+                              <a:rPr lang="en-US" sz="2000" i="1">
+                                <a:latin typeface="Cambria Math" panose="02040503050406030204" pitchFamily="18" charset="0"/>
+                              </a:rPr>
+                              <m:t>𝑠𝑒𝑐</m:t>
+                            </m:r>
+                          </m:den>
+                        </m:f>
+                      </m:e>
+                    </m:d>
+                    <m:r>
+                      <a:rPr lang="en-US" sz="2000" i="1">
+                        <a:latin typeface="Cambria Math" panose="02040503050406030204" pitchFamily="18" charset="0"/>
+                      </a:rPr>
+                      <m:t>  </m:t>
+                    </m:r>
+                  </m:oMath>
+                </a14:m>
+                <a:endParaRPr lang="en-US" sz="2000" dirty="0"/>
+              </a:p>
+              <a:p>
+                <a:pPr marL="0" indent="0">
+                  <a:buNone/>
+                </a:pPr>
+                <a:r>
+                  <a:rPr lang="en-US" sz="2000" dirty="0"/>
+                  <a:t> </a:t>
+                </a:r>
+              </a:p>
+              <a:p>
+                <a:endParaRPr lang="en-US" sz="2000" dirty="0"/>
+              </a:p>
+            </p:txBody>
+          </p:sp>
+        </mc:Choice>
+        <mc:Fallback xmlns="">
+          <p:sp>
+            <p:nvSpPr>
+              <p:cNvPr id="3" name="מציין מיקום תוכן 2">
+                <a:extLst>
+                  <a:ext uri="{FF2B5EF4-FFF2-40B4-BE49-F238E27FC236}">
+                    <a16:creationId xmlns:a16="http://schemas.microsoft.com/office/drawing/2014/main" id="{175841C0-4F8E-41BA-AF63-B983C98C91CF}"/>
+                  </a:ext>
+                </a:extLst>
+              </p:cNvPr>
+              <p:cNvSpPr>
+                <a:spLocks noGrp="1" noRot="1" noChangeAspect="1" noMove="1" noResize="1" noEditPoints="1" noAdjustHandles="1" noChangeArrowheads="1" noChangeShapeType="1" noTextEdit="1"/>
+              </p:cNvSpPr>
+              <p:nvPr>
+                <p:ph idx="1"/>
+              </p:nvPr>
+            </p:nvSpPr>
+            <p:spPr>
+              <a:xfrm>
+                <a:off x="915202" y="2181760"/>
+                <a:ext cx="10515600" cy="4351338"/>
+              </a:xfrm>
+              <a:blipFill>
+                <a:blip r:embed="rId3"/>
+                <a:stretch>
+                  <a:fillRect l="-522" t="-1541"/>
+                </a:stretch>
+              </a:blipFill>
+            </p:spPr>
+            <p:txBody>
+              <a:bodyPr/>
+              <a:lstStyle/>
+              <a:p>
+                <a:r>
+                  <a:rPr lang="en-US">
+                    <a:noFill/>
+                  </a:rPr>
+                  <a:t> </a:t>
+                </a:r>
+              </a:p>
+            </p:txBody>
+          </p:sp>
+        </mc:Fallback>
+      </mc:AlternateContent>
+      <p:sp>
+        <p:nvSpPr>
+          <p:cNvPr id="4" name="Title 1">
+            <a:extLst>
+              <a:ext uri="{FF2B5EF4-FFF2-40B4-BE49-F238E27FC236}">
+                <a16:creationId xmlns:a16="http://schemas.microsoft.com/office/drawing/2014/main" id="{BBE9E3DB-40AA-4002-83DE-6FEDE3356052}"/>
+              </a:ext>
+            </a:extLst>
+          </p:cNvPr>
+          <p:cNvSpPr txBox="1">
+            <a:spLocks/>
+          </p:cNvSpPr>
+          <p:nvPr/>
+        </p:nvSpPr>
+        <p:spPr>
+          <a:xfrm>
+            <a:off x="990600" y="517525"/>
+            <a:ext cx="10515600" cy="1325563"/>
+          </a:xfrm>
+          <a:prstGeom prst="rect">
+            <a:avLst/>
+          </a:prstGeom>
+        </p:spPr>
+        <p:txBody>
+          <a:bodyPr vert="horz" lIns="91440" tIns="45720" rIns="91440" bIns="45720" rtlCol="0" anchor="ctr">
+            <a:normAutofit/>
+          </a:bodyPr>
+          <a:lstStyle>
+            <a:lvl1pPr algn="l" defTabSz="914400" rtl="0" eaLnBrk="1" latinLnBrk="0" hangingPunct="1">
+              <a:lnSpc>
+                <a:spcPct val="90000"/>
+              </a:lnSpc>
+              <a:spcBef>
+                <a:spcPct val="0"/>
+              </a:spcBef>
+              <a:buNone/>
+              <a:defRPr sz="4400" kern="1200">
+                <a:solidFill>
+                  <a:schemeClr val="tx1"/>
+                </a:solidFill>
+                <a:latin typeface="+mj-lt"/>
+                <a:ea typeface="+mj-ea"/>
+                <a:cs typeface="+mj-cs"/>
+              </a:defRPr>
+            </a:lvl1pPr>
+          </a:lstStyle>
+          <a:p>
+            <a:r>
+              <a:rPr lang="en-US" dirty="0"/>
+              <a:t>First Pipeline Throughput</a:t>
+            </a:r>
+          </a:p>
+        </p:txBody>
+      </p:sp>
+    </p:spTree>
+    <p:extLst>
+      <p:ext uri="{BB962C8B-B14F-4D97-AF65-F5344CB8AC3E}">
+        <p14:creationId xmlns:p14="http://schemas.microsoft.com/office/powerpoint/2010/main" val="176148275"/>
+      </p:ext>
+    </p:extLst>
+  </p:cSld>
+  <p:clrMapOvr>
+    <a:masterClrMapping/>
+  </p:clrMapOvr>
+</p:sld>
+</file>
+
+<file path=ppt/slides/slide25.xml><?xml version="1.0" encoding="utf-8"?>
 <p:sld xmlns:a="http://schemas.openxmlformats.org/drawingml/2006/main" xmlns:r="http://schemas.openxmlformats.org/officeDocument/2006/relationships" xmlns:p="http://schemas.openxmlformats.org/presentationml/2006/main">
   <p:cSld>
     <p:spTree>
@@ -11433,882 +11890,7 @@
 </p:sld>
 </file>
 
-<file path=ppt/slides/slide25.xml><?xml version="1.0" encoding="utf-8"?>
-<p:sld xmlns:a="http://schemas.openxmlformats.org/drawingml/2006/main" xmlns:r="http://schemas.openxmlformats.org/officeDocument/2006/relationships" xmlns:p="http://schemas.openxmlformats.org/presentationml/2006/main">
-  <p:cSld>
-    <p:spTree>
-      <p:nvGrpSpPr>
-        <p:cNvPr id="1" name=""/>
-        <p:cNvGrpSpPr/>
-        <p:nvPr/>
-      </p:nvGrpSpPr>
-      <p:grpSpPr>
-        <a:xfrm>
-          <a:off x="0" y="0"/>
-          <a:ext cx="0" cy="0"/>
-          <a:chOff x="0" y="0"/>
-          <a:chExt cx="0" cy="0"/>
-        </a:xfrm>
-      </p:grpSpPr>
-      <mc:AlternateContent xmlns:mc="http://schemas.openxmlformats.org/markup-compatibility/2006" xmlns:a14="http://schemas.microsoft.com/office/drawing/2010/main">
-        <mc:Choice Requires="a14">
-          <p:sp>
-            <p:nvSpPr>
-              <p:cNvPr id="3" name="מציין מיקום תוכן 2">
-                <a:extLst>
-                  <a:ext uri="{FF2B5EF4-FFF2-40B4-BE49-F238E27FC236}">
-                    <a16:creationId xmlns:a16="http://schemas.microsoft.com/office/drawing/2014/main" id="{175841C0-4F8E-41BA-AF63-B983C98C91CF}"/>
-                  </a:ext>
-                </a:extLst>
-              </p:cNvPr>
-              <p:cNvSpPr>
-                <a:spLocks noGrp="1"/>
-              </p:cNvSpPr>
-              <p:nvPr>
-                <p:ph idx="1"/>
-              </p:nvPr>
-            </p:nvSpPr>
-            <p:spPr>
-              <a:xfrm>
-                <a:off x="915202" y="2181760"/>
-                <a:ext cx="10515600" cy="4351338"/>
-              </a:xfrm>
-            </p:spPr>
-            <p:txBody>
-              <a:bodyPr>
-                <a:normAutofit/>
-              </a:bodyPr>
-              <a:lstStyle/>
-              <a:p>
-                <a:r>
-                  <a:rPr lang="en-US" sz="2000" dirty="0"/>
-                  <a:t>Three clock cycles are needed to fill this module pipeline.</a:t>
-                </a:r>
-              </a:p>
-              <a:p>
-                <a:r>
-                  <a:rPr lang="en-US" sz="2000" dirty="0"/>
-                  <a:t>After the pipeline is filled, every clock cycle a new point is classified.</a:t>
-                </a:r>
-              </a:p>
-              <a:p>
-                <a:r>
-                  <a:rPr lang="en-US" sz="2000" dirty="0"/>
-                  <a:t>So the throughput  is of one new point classification per cycle. </a:t>
-                </a:r>
-              </a:p>
-              <a:p>
-                <a:r>
-                  <a:rPr lang="en-US" sz="2000" dirty="0"/>
-                  <a:t>The bandwidth therefore can be calculated as the point size in Bytes per clock cycle.</a:t>
-                </a:r>
-              </a:p>
-              <a:p>
-                <a:r>
-                  <a:rPr lang="en-US" sz="2000" dirty="0"/>
-                  <a:t>For example, if the used clock has a 100 </a:t>
-                </a:r>
-                <a:r>
-                  <a:rPr lang="en-US" sz="2000" dirty="0" err="1"/>
-                  <a:t>Mhz</a:t>
-                </a:r>
-                <a:r>
-                  <a:rPr lang="en-US" sz="2000" dirty="0"/>
-                  <a:t> frequency, the block’s bandwidth is as described below:</a:t>
-                </a:r>
-              </a:p>
-              <a:p>
-                <a:pPr marL="0" indent="0">
-                  <a:buNone/>
-                </a:pPr>
-                <a:r>
-                  <a:rPr lang="en-US" sz="2000" dirty="0"/>
-                  <a:t>	</a:t>
-                </a:r>
-                <a14:m>
-                  <m:oMath xmlns:m="http://schemas.openxmlformats.org/officeDocument/2006/math">
-                    <m:r>
-                      <a:rPr lang="en-US" sz="2000" i="1">
-                        <a:latin typeface="Cambria Math" panose="02040503050406030204" pitchFamily="18" charset="0"/>
-                      </a:rPr>
-                      <m:t>𝑏𝑎𝑛𝑑𝑤𝑖𝑑𝑡</m:t>
-                    </m:r>
-                    <m:sSub>
-                      <m:sSubPr>
-                        <m:ctrlPr>
-                          <a:rPr lang="en-US" sz="2000" i="1">
-                            <a:latin typeface="Cambria Math" panose="02040503050406030204" pitchFamily="18" charset="0"/>
-                          </a:rPr>
-                        </m:ctrlPr>
-                      </m:sSubPr>
-                      <m:e>
-                        <m:r>
-                          <a:rPr lang="en-US" sz="2000" i="1">
-                            <a:latin typeface="Cambria Math" panose="02040503050406030204" pitchFamily="18" charset="0"/>
-                          </a:rPr>
-                          <m:t>h</m:t>
-                        </m:r>
-                      </m:e>
-                      <m:sub>
-                        <m:r>
-                          <a:rPr lang="en-US" sz="2000" i="1">
-                            <a:latin typeface="Cambria Math" panose="02040503050406030204" pitchFamily="18" charset="0"/>
-                          </a:rPr>
-                          <m:t>𝑝𝑖𝑝𝑒</m:t>
-                        </m:r>
-                        <m:r>
-                          <a:rPr lang="en-US" sz="2000" i="1">
-                            <a:latin typeface="Cambria Math" panose="02040503050406030204" pitchFamily="18" charset="0"/>
-                          </a:rPr>
-                          <m:t>1</m:t>
-                        </m:r>
-                      </m:sub>
-                    </m:sSub>
-                    <m:r>
-                      <a:rPr lang="en-US" sz="2000" i="1">
-                        <a:latin typeface="Cambria Math" panose="02040503050406030204" pitchFamily="18" charset="0"/>
-                      </a:rPr>
-                      <m:t>=</m:t>
-                    </m:r>
-                    <m:f>
-                      <m:fPr>
-                        <m:ctrlPr>
-                          <a:rPr lang="en-US" sz="2000" i="1">
-                            <a:latin typeface="Cambria Math" panose="02040503050406030204" pitchFamily="18" charset="0"/>
-                          </a:rPr>
-                        </m:ctrlPr>
-                      </m:fPr>
-                      <m:num>
-                        <m:r>
-                          <a:rPr lang="en-US" sz="2000" i="1">
-                            <a:latin typeface="Cambria Math" panose="02040503050406030204" pitchFamily="18" charset="0"/>
-                          </a:rPr>
-                          <m:t>91</m:t>
-                        </m:r>
-                        <m:r>
-                          <a:rPr lang="en-US" sz="2000" i="1">
-                            <a:latin typeface="Cambria Math" panose="02040503050406030204" pitchFamily="18" charset="0"/>
-                          </a:rPr>
-                          <m:t>𝑏𝑖𝑡𝑠</m:t>
-                        </m:r>
-                      </m:num>
-                      <m:den>
-                        <m:r>
-                          <a:rPr lang="en-US" sz="2000" i="1">
-                            <a:latin typeface="Cambria Math" panose="02040503050406030204" pitchFamily="18" charset="0"/>
-                          </a:rPr>
-                          <m:t>5</m:t>
-                        </m:r>
-                        <m:r>
-                          <a:rPr lang="en-US" sz="2000" i="1">
-                            <a:latin typeface="Cambria Math" panose="02040503050406030204" pitchFamily="18" charset="0"/>
-                          </a:rPr>
-                          <m:t> </m:t>
-                        </m:r>
-                        <m:r>
-                          <a:rPr lang="en-US" sz="2000" i="1">
-                            <a:latin typeface="Cambria Math" panose="02040503050406030204" pitchFamily="18" charset="0"/>
-                          </a:rPr>
-                          <m:t>𝑛𝑠𝑒𝑐𝑠</m:t>
-                        </m:r>
-                      </m:den>
-                    </m:f>
-                    <m:r>
-                      <a:rPr lang="en-US" sz="2000" i="1">
-                        <a:latin typeface="Cambria Math" panose="02040503050406030204" pitchFamily="18" charset="0"/>
-                      </a:rPr>
-                      <m:t>=</m:t>
-                    </m:r>
-                    <m:f>
-                      <m:fPr>
-                        <m:ctrlPr>
-                          <a:rPr lang="en-US" sz="2000" i="1">
-                            <a:latin typeface="Cambria Math" panose="02040503050406030204" pitchFamily="18" charset="0"/>
-                          </a:rPr>
-                        </m:ctrlPr>
-                      </m:fPr>
-                      <m:num>
-                        <m:r>
-                          <a:rPr lang="en-US" sz="2000" i="1">
-                            <a:latin typeface="Cambria Math" panose="02040503050406030204" pitchFamily="18" charset="0"/>
-                          </a:rPr>
-                          <m:t>11</m:t>
-                        </m:r>
-                        <m:r>
-                          <a:rPr lang="en-US" sz="2000" i="1">
-                            <a:latin typeface="Cambria Math" panose="02040503050406030204" pitchFamily="18" charset="0"/>
-                          </a:rPr>
-                          <m:t>.</m:t>
-                        </m:r>
-                        <m:r>
-                          <a:rPr lang="en-US" sz="2000" i="1">
-                            <a:latin typeface="Cambria Math" panose="02040503050406030204" pitchFamily="18" charset="0"/>
-                          </a:rPr>
-                          <m:t>375</m:t>
-                        </m:r>
-                        <m:r>
-                          <a:rPr lang="en-US" sz="2000" i="1">
-                            <a:latin typeface="Cambria Math" panose="02040503050406030204" pitchFamily="18" charset="0"/>
-                          </a:rPr>
-                          <m:t> </m:t>
-                        </m:r>
-                        <m:r>
-                          <a:rPr lang="en-US" sz="2000" i="1">
-                            <a:latin typeface="Cambria Math" panose="02040503050406030204" pitchFamily="18" charset="0"/>
-                          </a:rPr>
-                          <m:t>𝐵𝑦𝑡𝑒𝑠</m:t>
-                        </m:r>
-                      </m:num>
-                      <m:den>
-                        <m:r>
-                          <a:rPr lang="en-US" sz="2000" i="1">
-                            <a:latin typeface="Cambria Math" panose="02040503050406030204" pitchFamily="18" charset="0"/>
-                          </a:rPr>
-                          <m:t>5</m:t>
-                        </m:r>
-                        <m:r>
-                          <a:rPr lang="en-US" sz="2000" i="1">
-                            <a:latin typeface="Cambria Math" panose="02040503050406030204" pitchFamily="18" charset="0"/>
-                          </a:rPr>
-                          <m:t> </m:t>
-                        </m:r>
-                        <m:r>
-                          <a:rPr lang="en-US" sz="2000" i="1">
-                            <a:latin typeface="Cambria Math" panose="02040503050406030204" pitchFamily="18" charset="0"/>
-                          </a:rPr>
-                          <m:t>𝑛𝑠𝑒𝑐𝑠</m:t>
-                        </m:r>
-                      </m:den>
-                    </m:f>
-                    <m:r>
-                      <a:rPr lang="en-US" sz="2000" i="1">
-                        <a:latin typeface="Cambria Math" panose="02040503050406030204" pitchFamily="18" charset="0"/>
-                      </a:rPr>
-                      <m:t>=</m:t>
-                    </m:r>
-                    <m:r>
-                      <a:rPr lang="en-US" sz="2000" i="1">
-                        <a:latin typeface="Cambria Math" panose="02040503050406030204" pitchFamily="18" charset="0"/>
-                      </a:rPr>
-                      <m:t>2</m:t>
-                    </m:r>
-                    <m:r>
-                      <a:rPr lang="en-US" sz="2000" i="1">
-                        <a:latin typeface="Cambria Math" panose="02040503050406030204" pitchFamily="18" charset="0"/>
-                      </a:rPr>
-                      <m:t>.</m:t>
-                    </m:r>
-                    <m:r>
-                      <a:rPr lang="en-US" sz="2000" i="1">
-                        <a:latin typeface="Cambria Math" panose="02040503050406030204" pitchFamily="18" charset="0"/>
-                      </a:rPr>
-                      <m:t>275</m:t>
-                    </m:r>
-                    <m:r>
-                      <a:rPr lang="en-US" sz="2000" i="1">
-                        <a:latin typeface="Cambria Math" panose="02040503050406030204" pitchFamily="18" charset="0"/>
-                      </a:rPr>
-                      <m:t> </m:t>
-                    </m:r>
-                    <m:d>
-                      <m:dPr>
-                        <m:begChr m:val="["/>
-                        <m:endChr m:val="]"/>
-                        <m:ctrlPr>
-                          <a:rPr lang="en-US" sz="2000" i="1">
-                            <a:latin typeface="Cambria Math" panose="02040503050406030204" pitchFamily="18" charset="0"/>
-                          </a:rPr>
-                        </m:ctrlPr>
-                      </m:dPr>
-                      <m:e>
-                        <m:f>
-                          <m:fPr>
-                            <m:ctrlPr>
-                              <a:rPr lang="en-US" sz="2000" i="1">
-                                <a:latin typeface="Cambria Math" panose="02040503050406030204" pitchFamily="18" charset="0"/>
-                              </a:rPr>
-                            </m:ctrlPr>
-                          </m:fPr>
-                          <m:num>
-                            <m:r>
-                              <a:rPr lang="en-US" sz="2000" i="1">
-                                <a:latin typeface="Cambria Math" panose="02040503050406030204" pitchFamily="18" charset="0"/>
-                              </a:rPr>
-                              <m:t>𝑀𝐵</m:t>
-                            </m:r>
-                          </m:num>
-                          <m:den>
-                            <m:r>
-                              <a:rPr lang="en-US" sz="2000" i="1">
-                                <a:latin typeface="Cambria Math" panose="02040503050406030204" pitchFamily="18" charset="0"/>
-                              </a:rPr>
-                              <m:t>𝑠𝑒𝑐</m:t>
-                            </m:r>
-                          </m:den>
-                        </m:f>
-                      </m:e>
-                    </m:d>
-                    <m:r>
-                      <a:rPr lang="en-US" sz="2000" i="1">
-                        <a:latin typeface="Cambria Math" panose="02040503050406030204" pitchFamily="18" charset="0"/>
-                      </a:rPr>
-                      <m:t>  </m:t>
-                    </m:r>
-                  </m:oMath>
-                </a14:m>
-                <a:endParaRPr lang="en-US" sz="2000" dirty="0"/>
-              </a:p>
-              <a:p>
-                <a:pPr marL="0" indent="0">
-                  <a:buNone/>
-                </a:pPr>
-                <a:r>
-                  <a:rPr lang="en-US" sz="2000" dirty="0"/>
-                  <a:t> </a:t>
-                </a:r>
-              </a:p>
-              <a:p>
-                <a:endParaRPr lang="en-US" sz="2000" dirty="0"/>
-              </a:p>
-            </p:txBody>
-          </p:sp>
-        </mc:Choice>
-        <mc:Fallback xmlns="">
-          <p:sp>
-            <p:nvSpPr>
-              <p:cNvPr id="3" name="מציין מיקום תוכן 2">
-                <a:extLst>
-                  <a:ext uri="{FF2B5EF4-FFF2-40B4-BE49-F238E27FC236}">
-                    <a16:creationId xmlns:a16="http://schemas.microsoft.com/office/drawing/2014/main" id="{175841C0-4F8E-41BA-AF63-B983C98C91CF}"/>
-                  </a:ext>
-                </a:extLst>
-              </p:cNvPr>
-              <p:cNvSpPr>
-                <a:spLocks noGrp="1" noRot="1" noChangeAspect="1" noMove="1" noResize="1" noEditPoints="1" noAdjustHandles="1" noChangeArrowheads="1" noChangeShapeType="1" noTextEdit="1"/>
-              </p:cNvSpPr>
-              <p:nvPr>
-                <p:ph idx="1"/>
-              </p:nvPr>
-            </p:nvSpPr>
-            <p:spPr>
-              <a:xfrm>
-                <a:off x="915202" y="2181760"/>
-                <a:ext cx="10515600" cy="4351338"/>
-              </a:xfrm>
-              <a:blipFill>
-                <a:blip r:embed="rId3"/>
-                <a:stretch>
-                  <a:fillRect l="-522" t="-1541"/>
-                </a:stretch>
-              </a:blipFill>
-            </p:spPr>
-            <p:txBody>
-              <a:bodyPr/>
-              <a:lstStyle/>
-              <a:p>
-                <a:r>
-                  <a:rPr lang="en-US">
-                    <a:noFill/>
-                  </a:rPr>
-                  <a:t> </a:t>
-                </a:r>
-              </a:p>
-            </p:txBody>
-          </p:sp>
-        </mc:Fallback>
-      </mc:AlternateContent>
-      <p:sp>
-        <p:nvSpPr>
-          <p:cNvPr id="4" name="Title 1">
-            <a:extLst>
-              <a:ext uri="{FF2B5EF4-FFF2-40B4-BE49-F238E27FC236}">
-                <a16:creationId xmlns:a16="http://schemas.microsoft.com/office/drawing/2014/main" id="{BBE9E3DB-40AA-4002-83DE-6FEDE3356052}"/>
-              </a:ext>
-            </a:extLst>
-          </p:cNvPr>
-          <p:cNvSpPr txBox="1">
-            <a:spLocks/>
-          </p:cNvSpPr>
-          <p:nvPr/>
-        </p:nvSpPr>
-        <p:spPr>
-          <a:xfrm>
-            <a:off x="990600" y="517525"/>
-            <a:ext cx="10515600" cy="1325563"/>
-          </a:xfrm>
-          <a:prstGeom prst="rect">
-            <a:avLst/>
-          </a:prstGeom>
-        </p:spPr>
-        <p:txBody>
-          <a:bodyPr vert="horz" lIns="91440" tIns="45720" rIns="91440" bIns="45720" rtlCol="0" anchor="ctr">
-            <a:normAutofit/>
-          </a:bodyPr>
-          <a:lstStyle>
-            <a:lvl1pPr algn="l" defTabSz="914400" rtl="0" eaLnBrk="1" latinLnBrk="0" hangingPunct="1">
-              <a:lnSpc>
-                <a:spcPct val="90000"/>
-              </a:lnSpc>
-              <a:spcBef>
-                <a:spcPct val="0"/>
-              </a:spcBef>
-              <a:buNone/>
-              <a:defRPr sz="4400" kern="1200">
-                <a:solidFill>
-                  <a:schemeClr val="tx1"/>
-                </a:solidFill>
-                <a:latin typeface="+mj-lt"/>
-                <a:ea typeface="+mj-ea"/>
-                <a:cs typeface="+mj-cs"/>
-              </a:defRPr>
-            </a:lvl1pPr>
-          </a:lstStyle>
-          <a:p>
-            <a:r>
-              <a:rPr lang="en-US" dirty="0"/>
-              <a:t>First Pipeline Throughput</a:t>
-            </a:r>
-          </a:p>
-        </p:txBody>
-      </p:sp>
-    </p:spTree>
-    <p:extLst>
-      <p:ext uri="{BB962C8B-B14F-4D97-AF65-F5344CB8AC3E}">
-        <p14:creationId xmlns:p14="http://schemas.microsoft.com/office/powerpoint/2010/main" val="176148275"/>
-      </p:ext>
-    </p:extLst>
-  </p:cSld>
-  <p:clrMapOvr>
-    <a:masterClrMapping/>
-  </p:clrMapOvr>
-</p:sld>
-</file>
-
 <file path=ppt/slides/slide26.xml><?xml version="1.0" encoding="utf-8"?>
-<p:sld xmlns:a="http://schemas.openxmlformats.org/drawingml/2006/main" xmlns:r="http://schemas.openxmlformats.org/officeDocument/2006/relationships" xmlns:p="http://schemas.openxmlformats.org/presentationml/2006/main">
-  <p:cSld>
-    <p:spTree>
-      <p:nvGrpSpPr>
-        <p:cNvPr id="1" name=""/>
-        <p:cNvGrpSpPr/>
-        <p:nvPr/>
-      </p:nvGrpSpPr>
-      <p:grpSpPr>
-        <a:xfrm>
-          <a:off x="0" y="0"/>
-          <a:ext cx="0" cy="0"/>
-          <a:chOff x="0" y="0"/>
-          <a:chExt cx="0" cy="0"/>
-        </a:xfrm>
-      </p:grpSpPr>
-      <p:pic>
-        <p:nvPicPr>
-          <p:cNvPr id="7" name="מציין מיקום תוכן 6" descr="תמונה שמכילה צילום מסך&#10;&#10;התיאור נוצר באופן אוטומטי">
-            <a:extLst>
-              <a:ext uri="{FF2B5EF4-FFF2-40B4-BE49-F238E27FC236}">
-                <a16:creationId xmlns:a16="http://schemas.microsoft.com/office/drawing/2014/main" id="{518D7220-49DC-41A7-BC17-AD3D2E4198C0}"/>
-              </a:ext>
-            </a:extLst>
-          </p:cNvPr>
-          <p:cNvPicPr>
-            <a:picLocks noGrp="1" noChangeAspect="1"/>
-          </p:cNvPicPr>
-          <p:nvPr>
-            <p:ph idx="1"/>
-          </p:nvPr>
-        </p:nvPicPr>
-        <p:blipFill>
-          <a:blip r:embed="rId3"/>
-          <a:stretch>
-            <a:fillRect/>
-          </a:stretch>
-        </p:blipFill>
-        <p:spPr>
-          <a:xfrm>
-            <a:off x="1369845" y="2196933"/>
-            <a:ext cx="9757110" cy="3024497"/>
-          </a:xfrm>
-        </p:spPr>
-      </p:pic>
-      <p:sp>
-        <p:nvSpPr>
-          <p:cNvPr id="8" name="Title 1">
-            <a:extLst>
-              <a:ext uri="{FF2B5EF4-FFF2-40B4-BE49-F238E27FC236}">
-                <a16:creationId xmlns:a16="http://schemas.microsoft.com/office/drawing/2014/main" id="{1317F365-AFEB-4BA5-B5D8-47D361FA94BC}"/>
-              </a:ext>
-            </a:extLst>
-          </p:cNvPr>
-          <p:cNvSpPr txBox="1">
-            <a:spLocks/>
-          </p:cNvSpPr>
-          <p:nvPr/>
-        </p:nvSpPr>
-        <p:spPr>
-          <a:xfrm>
-            <a:off x="990600" y="517525"/>
-            <a:ext cx="10515600" cy="1325563"/>
-          </a:xfrm>
-          <a:prstGeom prst="rect">
-            <a:avLst/>
-          </a:prstGeom>
-        </p:spPr>
-        <p:txBody>
-          <a:bodyPr vert="horz" lIns="91440" tIns="45720" rIns="91440" bIns="45720" rtlCol="0" anchor="ctr">
-            <a:normAutofit/>
-          </a:bodyPr>
-          <a:lstStyle>
-            <a:lvl1pPr algn="l" defTabSz="914400" rtl="0" eaLnBrk="1" latinLnBrk="0" hangingPunct="1">
-              <a:lnSpc>
-                <a:spcPct val="90000"/>
-              </a:lnSpc>
-              <a:spcBef>
-                <a:spcPct val="0"/>
-              </a:spcBef>
-              <a:buNone/>
-              <a:defRPr sz="4400" kern="1200">
-                <a:solidFill>
-                  <a:schemeClr val="tx1"/>
-                </a:solidFill>
-                <a:latin typeface="+mj-lt"/>
-                <a:ea typeface="+mj-ea"/>
-                <a:cs typeface="+mj-cs"/>
-              </a:defRPr>
-            </a:lvl1pPr>
-          </a:lstStyle>
-          <a:p>
-            <a:r>
-              <a:rPr lang="en-US" dirty="0"/>
-              <a:t>Second Pipeline Latency</a:t>
-            </a:r>
-          </a:p>
-        </p:txBody>
-      </p:sp>
-      <mc:AlternateContent xmlns:mc="http://schemas.openxmlformats.org/markup-compatibility/2006" xmlns:a14="http://schemas.microsoft.com/office/drawing/2010/main">
-        <mc:Choice Requires="a14">
-          <p:sp>
-            <p:nvSpPr>
-              <p:cNvPr id="2" name="Rectangle 1">
-                <a:extLst>
-                  <a:ext uri="{FF2B5EF4-FFF2-40B4-BE49-F238E27FC236}">
-                    <a16:creationId xmlns:a16="http://schemas.microsoft.com/office/drawing/2014/main" id="{4932DEF6-A245-4B42-A8F2-2583F59DEC7B}"/>
-                  </a:ext>
-                </a:extLst>
-              </p:cNvPr>
-              <p:cNvSpPr/>
-              <p:nvPr/>
-            </p:nvSpPr>
-            <p:spPr>
-              <a:xfrm>
-                <a:off x="394710" y="5651312"/>
-                <a:ext cx="11548533" cy="1020536"/>
-              </a:xfrm>
-              <a:prstGeom prst="rect">
-                <a:avLst/>
-              </a:prstGeom>
-            </p:spPr>
-            <p:txBody>
-              <a:bodyPr wrap="square">
-                <a:spAutoFit/>
-              </a:bodyPr>
-              <a:lstStyle/>
-              <a:p>
-                <a:pPr/>
-                <a14:m>
-                  <m:oMathPara xmlns:m="http://schemas.openxmlformats.org/officeDocument/2006/math">
-                    <m:oMathParaPr>
-                      <m:jc m:val="centerGroup"/>
-                    </m:oMathParaPr>
-                    <m:oMath xmlns:m="http://schemas.openxmlformats.org/officeDocument/2006/math">
-                      <m:r>
-                        <a:rPr lang="en-US" sz="2800" i="1">
-                          <a:latin typeface="Cambria Math" panose="02040503050406030204" pitchFamily="18" charset="0"/>
-                        </a:rPr>
-                        <m:t>𝑙𝑎𝑡𝑒𝑛𝑐</m:t>
-                      </m:r>
-                      <m:sSub>
-                        <m:sSubPr>
-                          <m:ctrlPr>
-                            <a:rPr lang="en-US" sz="2800" i="1">
-                              <a:latin typeface="Cambria Math" panose="02040503050406030204" pitchFamily="18" charset="0"/>
-                            </a:rPr>
-                          </m:ctrlPr>
-                        </m:sSubPr>
-                        <m:e>
-                          <m:r>
-                            <a:rPr lang="en-US" sz="2800" i="1">
-                              <a:latin typeface="Cambria Math" panose="02040503050406030204" pitchFamily="18" charset="0"/>
-                            </a:rPr>
-                            <m:t>𝑦</m:t>
-                          </m:r>
-                        </m:e>
-                        <m:sub>
-                          <m:r>
-                            <a:rPr lang="en-US" sz="2800" i="1">
-                              <a:latin typeface="Cambria Math" panose="02040503050406030204" pitchFamily="18" charset="0"/>
-                            </a:rPr>
-                            <m:t>𝑝𝑖𝑝𝑒</m:t>
-                          </m:r>
-                          <m:r>
-                            <a:rPr lang="en-US" sz="2800" i="1">
-                              <a:latin typeface="Cambria Math" panose="02040503050406030204" pitchFamily="18" charset="0"/>
-                            </a:rPr>
-                            <m:t>2</m:t>
-                          </m:r>
-                        </m:sub>
-                      </m:sSub>
-                      <m:r>
-                        <a:rPr lang="en-US" sz="2800" i="1">
-                          <a:latin typeface="Cambria Math" panose="02040503050406030204" pitchFamily="18" charset="0"/>
-                        </a:rPr>
-                        <m:t>=</m:t>
-                      </m:r>
-                      <m:d>
-                        <m:dPr>
-                          <m:ctrlPr>
-                            <a:rPr lang="en-US" sz="2800" i="1">
-                              <a:latin typeface="Cambria Math" panose="02040503050406030204" pitchFamily="18" charset="0"/>
-                            </a:rPr>
-                          </m:ctrlPr>
-                        </m:dPr>
-                        <m:e>
-                          <m:r>
-                            <a:rPr lang="en-US" sz="2800" i="1">
-                              <a:latin typeface="Cambria Math" panose="02040503050406030204" pitchFamily="18" charset="0"/>
-                            </a:rPr>
-                            <m:t>#</m:t>
-                          </m:r>
-                          <m:r>
-                            <a:rPr lang="en-US" sz="2800" i="1">
-                              <a:latin typeface="Cambria Math" panose="02040503050406030204" pitchFamily="18" charset="0"/>
-                            </a:rPr>
-                            <m:t>𝑐𝑒𝑛𝑡𝑟𝑜𝑖𝑑</m:t>
-                          </m:r>
-                        </m:e>
-                      </m:d>
-                      <m:r>
-                        <a:rPr lang="en-US" sz="2800" i="1">
-                          <a:latin typeface="Cambria Math" panose="02040503050406030204" pitchFamily="18" charset="0"/>
-                        </a:rPr>
-                        <m:t>∗</m:t>
-                      </m:r>
-                      <m:d>
-                        <m:dPr>
-                          <m:ctrlPr>
-                            <a:rPr lang="en-US" sz="2800" i="1">
-                              <a:latin typeface="Cambria Math" panose="02040503050406030204" pitchFamily="18" charset="0"/>
-                            </a:rPr>
-                          </m:ctrlPr>
-                        </m:dPr>
-                        <m:e>
-                          <m:r>
-                            <a:rPr lang="en-US" sz="2800" i="1">
-                              <a:latin typeface="Cambria Math" panose="02040503050406030204" pitchFamily="18" charset="0"/>
-                            </a:rPr>
-                            <m:t>2</m:t>
-                          </m:r>
-                          <m:r>
-                            <a:rPr lang="en-US" sz="2800" i="1">
-                              <a:latin typeface="Cambria Math" panose="02040503050406030204" pitchFamily="18" charset="0"/>
-                            </a:rPr>
-                            <m:t>+</m:t>
-                          </m:r>
-                          <m:r>
-                            <a:rPr lang="en-US" sz="2800" i="1">
-                              <a:latin typeface="Cambria Math" panose="02040503050406030204" pitchFamily="18" charset="0"/>
-                            </a:rPr>
-                            <m:t>1</m:t>
-                          </m:r>
-                        </m:e>
-                      </m:d>
-                      <m:r>
-                        <a:rPr lang="en-US" sz="2800" i="1">
-                          <a:latin typeface="Cambria Math" panose="02040503050406030204" pitchFamily="18" charset="0"/>
-                        </a:rPr>
-                        <m:t>+</m:t>
-                      </m:r>
-                      <m:r>
-                        <a:rPr lang="en-US" sz="2800" i="1">
-                          <a:latin typeface="Cambria Math" panose="02040503050406030204" pitchFamily="18" charset="0"/>
-                        </a:rPr>
-                        <m:t>1</m:t>
-                      </m:r>
-                    </m:oMath>
-                  </m:oMathPara>
-                </a14:m>
-                <a:endParaRPr lang="en-US" sz="2800" i="1" dirty="0"/>
-              </a:p>
-              <a:p>
-                <a:pPr/>
-                <a14:m>
-                  <m:oMathPara xmlns:m="http://schemas.openxmlformats.org/officeDocument/2006/math">
-                    <m:oMathParaPr>
-                      <m:jc m:val="centerGroup"/>
-                    </m:oMathParaPr>
-                    <m:oMath xmlns:m="http://schemas.openxmlformats.org/officeDocument/2006/math">
-                      <m:r>
-                        <a:rPr lang="en-US" sz="2800" i="1">
-                          <a:latin typeface="Cambria Math" panose="02040503050406030204" pitchFamily="18" charset="0"/>
-                        </a:rPr>
-                        <m:t>𝑙𝑎𝑡𝑒𝑛𝑐</m:t>
-                      </m:r>
-                      <m:sSub>
-                        <m:sSubPr>
-                          <m:ctrlPr>
-                            <a:rPr lang="en-US" sz="2800" i="1">
-                              <a:latin typeface="Cambria Math" panose="02040503050406030204" pitchFamily="18" charset="0"/>
-                            </a:rPr>
-                          </m:ctrlPr>
-                        </m:sSubPr>
-                        <m:e>
-                          <m:r>
-                            <a:rPr lang="en-US" sz="2800" i="1">
-                              <a:latin typeface="Cambria Math" panose="02040503050406030204" pitchFamily="18" charset="0"/>
-                            </a:rPr>
-                            <m:t>𝑦</m:t>
-                          </m:r>
-                        </m:e>
-                        <m:sub>
-                          <m:r>
-                            <a:rPr lang="en-US" sz="2800" i="1">
-                              <a:latin typeface="Cambria Math" panose="02040503050406030204" pitchFamily="18" charset="0"/>
-                            </a:rPr>
-                            <m:t>𝑝𝑖𝑝𝑒</m:t>
-                          </m:r>
-                          <m:r>
-                            <a:rPr lang="en-US" sz="2800" i="1">
-                              <a:latin typeface="Cambria Math" panose="02040503050406030204" pitchFamily="18" charset="0"/>
-                            </a:rPr>
-                            <m:t>2</m:t>
-                          </m:r>
-                        </m:sub>
-                      </m:sSub>
-                      <m:r>
-                        <a:rPr lang="en-US" sz="2800" i="1">
-                          <a:latin typeface="Cambria Math" panose="02040503050406030204" pitchFamily="18" charset="0"/>
-                        </a:rPr>
-                        <m:t>=</m:t>
-                      </m:r>
-                      <m:r>
-                        <a:rPr lang="en-US" sz="2800" i="1">
-                          <a:latin typeface="Cambria Math" panose="02040503050406030204" pitchFamily="18" charset="0"/>
-                        </a:rPr>
-                        <m:t>8</m:t>
-                      </m:r>
-                      <m:r>
-                        <a:rPr lang="en-US" sz="2800" i="1">
-                          <a:latin typeface="Cambria Math" panose="02040503050406030204" pitchFamily="18" charset="0"/>
-                        </a:rPr>
-                        <m:t>∗</m:t>
-                      </m:r>
-                      <m:d>
-                        <m:dPr>
-                          <m:ctrlPr>
-                            <a:rPr lang="en-US" sz="2800" i="1">
-                              <a:latin typeface="Cambria Math" panose="02040503050406030204" pitchFamily="18" charset="0"/>
-                            </a:rPr>
-                          </m:ctrlPr>
-                        </m:dPr>
-                        <m:e>
-                          <m:r>
-                            <a:rPr lang="en-US" sz="2800" i="1">
-                              <a:latin typeface="Cambria Math" panose="02040503050406030204" pitchFamily="18" charset="0"/>
-                            </a:rPr>
-                            <m:t>2</m:t>
-                          </m:r>
-                          <m:r>
-                            <a:rPr lang="en-US" sz="2800" i="1">
-                              <a:latin typeface="Cambria Math" panose="02040503050406030204" pitchFamily="18" charset="0"/>
-                            </a:rPr>
-                            <m:t>+</m:t>
-                          </m:r>
-                          <m:r>
-                            <a:rPr lang="en-US" sz="2800" i="1">
-                              <a:latin typeface="Cambria Math" panose="02040503050406030204" pitchFamily="18" charset="0"/>
-                            </a:rPr>
-                            <m:t>1</m:t>
-                          </m:r>
-                        </m:e>
-                      </m:d>
-                      <m:r>
-                        <a:rPr lang="en-US" sz="2800" i="1">
-                          <a:latin typeface="Cambria Math" panose="02040503050406030204" pitchFamily="18" charset="0"/>
-                        </a:rPr>
-                        <m:t>+</m:t>
-                      </m:r>
-                      <m:r>
-                        <a:rPr lang="en-US" sz="2800" i="1">
-                          <a:latin typeface="Cambria Math" panose="02040503050406030204" pitchFamily="18" charset="0"/>
-                        </a:rPr>
-                        <m:t>1</m:t>
-                      </m:r>
-                    </m:oMath>
-                  </m:oMathPara>
-                </a14:m>
-                <a:endParaRPr lang="en-US" sz="2800" i="1" dirty="0"/>
-              </a:p>
-            </p:txBody>
-          </p:sp>
-        </mc:Choice>
-        <mc:Fallback xmlns="">
-          <p:sp>
-            <p:nvSpPr>
-              <p:cNvPr id="2" name="Rectangle 1">
-                <a:extLst>
-                  <a:ext uri="{FF2B5EF4-FFF2-40B4-BE49-F238E27FC236}">
-                    <a16:creationId xmlns:a16="http://schemas.microsoft.com/office/drawing/2014/main" id="{4932DEF6-A245-4B42-A8F2-2583F59DEC7B}"/>
-                  </a:ext>
-                </a:extLst>
-              </p:cNvPr>
-              <p:cNvSpPr>
-                <a:spLocks noRot="1" noChangeAspect="1" noMove="1" noResize="1" noEditPoints="1" noAdjustHandles="1" noChangeArrowheads="1" noChangeShapeType="1" noTextEdit="1"/>
-              </p:cNvSpPr>
-              <p:nvPr/>
-            </p:nvSpPr>
-            <p:spPr>
-              <a:xfrm>
-                <a:off x="394710" y="5651312"/>
-                <a:ext cx="11548533" cy="1020536"/>
-              </a:xfrm>
-              <a:prstGeom prst="rect">
-                <a:avLst/>
-              </a:prstGeom>
-              <a:blipFill>
-                <a:blip r:embed="rId4"/>
-                <a:stretch>
-                  <a:fillRect/>
-                </a:stretch>
-              </a:blipFill>
-            </p:spPr>
-            <p:txBody>
-              <a:bodyPr/>
-              <a:lstStyle/>
-              <a:p>
-                <a:r>
-                  <a:rPr lang="en-US">
-                    <a:noFill/>
-                  </a:rPr>
-                  <a:t> </a:t>
-                </a:r>
-              </a:p>
-            </p:txBody>
-          </p:sp>
-        </mc:Fallback>
-      </mc:AlternateContent>
-    </p:spTree>
-    <p:extLst>
-      <p:ext uri="{BB962C8B-B14F-4D97-AF65-F5344CB8AC3E}">
-        <p14:creationId xmlns:p14="http://schemas.microsoft.com/office/powerpoint/2010/main" val="4136201450"/>
-      </p:ext>
-    </p:extLst>
-  </p:cSld>
-  <p:clrMapOvr>
-    <a:masterClrMapping/>
-  </p:clrMapOvr>
-</p:sld>
-</file>
-
-<file path=ppt/slides/slide27.xml><?xml version="1.0" encoding="utf-8"?>
 <p:sld xmlns:a="http://schemas.openxmlformats.org/drawingml/2006/main" xmlns:r="http://schemas.openxmlformats.org/officeDocument/2006/relationships" xmlns:p="http://schemas.openxmlformats.org/presentationml/2006/main">
   <p:cSld>
     <p:spTree>
@@ -12759,6 +12341,339 @@
     <p:extLst>
       <p:ext uri="{BB962C8B-B14F-4D97-AF65-F5344CB8AC3E}">
         <p14:creationId xmlns:p14="http://schemas.microsoft.com/office/powerpoint/2010/main" val="1490900920"/>
+      </p:ext>
+    </p:extLst>
+  </p:cSld>
+  <p:clrMapOvr>
+    <a:masterClrMapping/>
+  </p:clrMapOvr>
+</p:sld>
+</file>
+
+<file path=ppt/slides/slide27.xml><?xml version="1.0" encoding="utf-8"?>
+<p:sld xmlns:a="http://schemas.openxmlformats.org/drawingml/2006/main" xmlns:r="http://schemas.openxmlformats.org/officeDocument/2006/relationships" xmlns:p="http://schemas.openxmlformats.org/presentationml/2006/main">
+  <p:cSld>
+    <p:spTree>
+      <p:nvGrpSpPr>
+        <p:cNvPr id="1" name=""/>
+        <p:cNvGrpSpPr/>
+        <p:nvPr/>
+      </p:nvGrpSpPr>
+      <p:grpSpPr>
+        <a:xfrm>
+          <a:off x="0" y="0"/>
+          <a:ext cx="0" cy="0"/>
+          <a:chOff x="0" y="0"/>
+          <a:chExt cx="0" cy="0"/>
+        </a:xfrm>
+      </p:grpSpPr>
+      <p:pic>
+        <p:nvPicPr>
+          <p:cNvPr id="7" name="מציין מיקום תוכן 6" descr="תמונה שמכילה צילום מסך&#10;&#10;התיאור נוצר באופן אוטומטי">
+            <a:extLst>
+              <a:ext uri="{FF2B5EF4-FFF2-40B4-BE49-F238E27FC236}">
+                <a16:creationId xmlns:a16="http://schemas.microsoft.com/office/drawing/2014/main" id="{518D7220-49DC-41A7-BC17-AD3D2E4198C0}"/>
+              </a:ext>
+            </a:extLst>
+          </p:cNvPr>
+          <p:cNvPicPr>
+            <a:picLocks noGrp="1" noChangeAspect="1"/>
+          </p:cNvPicPr>
+          <p:nvPr>
+            <p:ph idx="1"/>
+          </p:nvPr>
+        </p:nvPicPr>
+        <p:blipFill>
+          <a:blip r:embed="rId3"/>
+          <a:stretch>
+            <a:fillRect/>
+          </a:stretch>
+        </p:blipFill>
+        <p:spPr>
+          <a:xfrm>
+            <a:off x="1369845" y="2196933"/>
+            <a:ext cx="9757110" cy="3024497"/>
+          </a:xfrm>
+        </p:spPr>
+      </p:pic>
+      <p:sp>
+        <p:nvSpPr>
+          <p:cNvPr id="8" name="Title 1">
+            <a:extLst>
+              <a:ext uri="{FF2B5EF4-FFF2-40B4-BE49-F238E27FC236}">
+                <a16:creationId xmlns:a16="http://schemas.microsoft.com/office/drawing/2014/main" id="{1317F365-AFEB-4BA5-B5D8-47D361FA94BC}"/>
+              </a:ext>
+            </a:extLst>
+          </p:cNvPr>
+          <p:cNvSpPr txBox="1">
+            <a:spLocks/>
+          </p:cNvSpPr>
+          <p:nvPr/>
+        </p:nvSpPr>
+        <p:spPr>
+          <a:xfrm>
+            <a:off x="990600" y="517525"/>
+            <a:ext cx="10515600" cy="1325563"/>
+          </a:xfrm>
+          <a:prstGeom prst="rect">
+            <a:avLst/>
+          </a:prstGeom>
+        </p:spPr>
+        <p:txBody>
+          <a:bodyPr vert="horz" lIns="91440" tIns="45720" rIns="91440" bIns="45720" rtlCol="0" anchor="ctr">
+            <a:normAutofit/>
+          </a:bodyPr>
+          <a:lstStyle>
+            <a:lvl1pPr algn="l" defTabSz="914400" rtl="0" eaLnBrk="1" latinLnBrk="0" hangingPunct="1">
+              <a:lnSpc>
+                <a:spcPct val="90000"/>
+              </a:lnSpc>
+              <a:spcBef>
+                <a:spcPct val="0"/>
+              </a:spcBef>
+              <a:buNone/>
+              <a:defRPr sz="4400" kern="1200">
+                <a:solidFill>
+                  <a:schemeClr val="tx1"/>
+                </a:solidFill>
+                <a:latin typeface="+mj-lt"/>
+                <a:ea typeface="+mj-ea"/>
+                <a:cs typeface="+mj-cs"/>
+              </a:defRPr>
+            </a:lvl1pPr>
+          </a:lstStyle>
+          <a:p>
+            <a:r>
+              <a:rPr lang="en-US" dirty="0"/>
+              <a:t>Second Pipeline Latency</a:t>
+            </a:r>
+          </a:p>
+        </p:txBody>
+      </p:sp>
+      <mc:AlternateContent xmlns:mc="http://schemas.openxmlformats.org/markup-compatibility/2006">
+        <mc:Choice xmlns:a14="http://schemas.microsoft.com/office/drawing/2010/main" Requires="a14">
+          <p:sp>
+            <p:nvSpPr>
+              <p:cNvPr id="2" name="Rectangle 1">
+                <a:extLst>
+                  <a:ext uri="{FF2B5EF4-FFF2-40B4-BE49-F238E27FC236}">
+                    <a16:creationId xmlns:a16="http://schemas.microsoft.com/office/drawing/2014/main" id="{4932DEF6-A245-4B42-A8F2-2583F59DEC7B}"/>
+                  </a:ext>
+                </a:extLst>
+              </p:cNvPr>
+              <p:cNvSpPr/>
+              <p:nvPr/>
+            </p:nvSpPr>
+            <p:spPr>
+              <a:xfrm>
+                <a:off x="394710" y="5651312"/>
+                <a:ext cx="11548533" cy="921086"/>
+              </a:xfrm>
+              <a:prstGeom prst="rect">
+                <a:avLst/>
+              </a:prstGeom>
+            </p:spPr>
+            <p:txBody>
+              <a:bodyPr wrap="square">
+                <a:spAutoFit/>
+              </a:bodyPr>
+              <a:lstStyle/>
+              <a:p>
+                <a14:m>
+                  <m:oMathPara xmlns:m="http://schemas.openxmlformats.org/officeDocument/2006/math">
+                    <m:oMathParaPr>
+                      <m:jc m:val="centerGroup"/>
+                    </m:oMathParaPr>
+                    <m:oMath xmlns:m="http://schemas.openxmlformats.org/officeDocument/2006/math">
+                      <m:r>
+                        <a:rPr lang="en-US" sz="2400" i="1"/>
+                        <m:t>𝑙𝑎𝑡𝑒𝑛𝑐</m:t>
+                      </m:r>
+                      <m:sSub>
+                        <m:sSubPr>
+                          <m:ctrlPr>
+                            <a:rPr lang="en-US" sz="2400" i="1"/>
+                          </m:ctrlPr>
+                        </m:sSubPr>
+                        <m:e>
+                          <m:r>
+                            <a:rPr lang="en-US" sz="2400" i="1"/>
+                            <m:t>𝑦</m:t>
+                          </m:r>
+                        </m:e>
+                        <m:sub>
+                          <m:r>
+                            <a:rPr lang="en-US" sz="2400" i="1"/>
+                            <m:t>𝑝𝑖𝑝𝑒</m:t>
+                          </m:r>
+                          <m:r>
+                            <a:rPr lang="en-US" sz="2400" i="1"/>
+                            <m:t>2</m:t>
+                          </m:r>
+                        </m:sub>
+                      </m:sSub>
+                      <m:r>
+                        <a:rPr lang="en-US" sz="2400" i="1"/>
+                        <m:t>=</m:t>
+                      </m:r>
+                      <m:r>
+                        <a:rPr lang="en-US" sz="2400" i="1"/>
+                        <m:t>1</m:t>
+                      </m:r>
+                      <m:r>
+                        <a:rPr lang="en-US" sz="2400" i="1"/>
+                        <m:t>+</m:t>
+                      </m:r>
+                      <m:d>
+                        <m:dPr>
+                          <m:ctrlPr>
+                            <a:rPr lang="en-US" sz="2400" i="1"/>
+                          </m:ctrlPr>
+                        </m:dPr>
+                        <m:e>
+                          <m:r>
+                            <a:rPr lang="en-US" sz="2400" i="1"/>
+                            <m:t>𝑛𝑢𝑚𝑏𝑒𝑟</m:t>
+                          </m:r>
+                          <m:r>
+                            <a:rPr lang="en-US" sz="2400" i="1"/>
+                            <m:t> </m:t>
+                          </m:r>
+                          <m:r>
+                            <a:rPr lang="en-US" sz="2400" i="1"/>
+                            <m:t>𝑜𝑓</m:t>
+                          </m:r>
+                          <m:r>
+                            <a:rPr lang="en-US" sz="2400" i="1"/>
+                            <m:t> </m:t>
+                          </m:r>
+                          <m:r>
+                            <a:rPr lang="en-US" sz="2400" i="1"/>
+                            <m:t>𝑐𝑒𝑛𝑡𝑟𝑜𝑖𝑑𝑠</m:t>
+                          </m:r>
+                        </m:e>
+                      </m:d>
+                      <m:r>
+                        <a:rPr lang="en-US" sz="2400" i="1"/>
+                        <m:t>+</m:t>
+                      </m:r>
+                      <m:r>
+                        <a:rPr lang="en-US" sz="2400" i="1"/>
+                        <m:t>1</m:t>
+                      </m:r>
+                      <m:r>
+                        <a:rPr lang="en-US" sz="2400" i="1"/>
+                        <m:t>=</m:t>
+                      </m:r>
+                      <m:r>
+                        <a:rPr lang="en-US" sz="2400" i="1"/>
+                        <m:t>1</m:t>
+                      </m:r>
+                      <m:r>
+                        <a:rPr lang="en-US" sz="2400" i="1"/>
+                        <m:t>+</m:t>
+                      </m:r>
+                      <m:r>
+                        <a:rPr lang="en-US" sz="2400" i="1"/>
+                        <m:t>8</m:t>
+                      </m:r>
+                      <m:r>
+                        <a:rPr lang="en-US" sz="2400" i="1"/>
+                        <m:t>+</m:t>
+                      </m:r>
+                      <m:r>
+                        <a:rPr lang="en-US" sz="2400" i="1"/>
+                        <m:t>1</m:t>
+                      </m:r>
+                      <m:r>
+                        <a:rPr lang="en-US" sz="2400" i="1"/>
+                        <m:t>=</m:t>
+                      </m:r>
+                      <m:r>
+                        <a:rPr lang="en-US" sz="2400" i="1"/>
+                        <m:t>10</m:t>
+                      </m:r>
+                      <m:r>
+                        <a:rPr lang="en-US" sz="2400" i="1"/>
+                        <m:t> [</m:t>
+                      </m:r>
+                      <m:r>
+                        <a:rPr lang="en-US" sz="2400" i="1"/>
+                        <m:t>𝑐𝑙𝑜𝑐𝑘</m:t>
+                      </m:r>
+                      <m:r>
+                        <a:rPr lang="en-US" sz="2400" i="1"/>
+                        <m:t> </m:t>
+                      </m:r>
+                      <m:r>
+                        <a:rPr lang="en-US" sz="2400" i="1"/>
+                        <m:t>𝑐𝑦𝑐𝑙𝑒𝑠</m:t>
+                      </m:r>
+                      <m:r>
+                        <a:rPr lang="en-US" sz="2400" i="1"/>
+                        <m:t>]</m:t>
+                      </m:r>
+                    </m:oMath>
+                  </m:oMathPara>
+                </a14:m>
+                <a:endParaRPr lang="en-US" sz="2400" dirty="0"/>
+              </a:p>
+              <a:p>
+                <a:pPr/>
+                <a:endParaRPr lang="en-US" sz="2800" i="1" dirty="0"/>
+              </a:p>
+            </p:txBody>
+          </p:sp>
+        </mc:Choice>
+        <mc:Fallback>
+          <p:sp>
+            <p:nvSpPr>
+              <p:cNvPr id="2" name="Rectangle 1">
+                <a:extLst>
+                  <a:ext uri="{FF2B5EF4-FFF2-40B4-BE49-F238E27FC236}">
+                    <a16:creationId xmlns:a16="http://schemas.microsoft.com/office/drawing/2014/main" id="{4932DEF6-A245-4B42-A8F2-2583F59DEC7B}"/>
+                  </a:ext>
+                </a:extLst>
+              </p:cNvPr>
+              <p:cNvSpPr>
+                <a:spLocks noRot="1" noChangeAspect="1" noMove="1" noResize="1" noEditPoints="1" noAdjustHandles="1" noChangeArrowheads="1" noChangeShapeType="1" noTextEdit="1"/>
+              </p:cNvSpPr>
+              <p:nvPr/>
+            </p:nvSpPr>
+            <p:spPr>
+              <a:xfrm>
+                <a:off x="394710" y="5651312"/>
+                <a:ext cx="11548533" cy="921086"/>
+              </a:xfrm>
+              <a:prstGeom prst="rect">
+                <a:avLst/>
+              </a:prstGeom>
+              <a:blipFill>
+                <a:blip r:embed="rId4"/>
+                <a:stretch>
+                  <a:fillRect/>
+                </a:stretch>
+              </a:blipFill>
+            </p:spPr>
+            <p:txBody>
+              <a:bodyPr/>
+              <a:lstStyle/>
+              <a:p>
+                <a:r>
+                  <a:rPr lang="en-US">
+                    <a:noFill/>
+                  </a:rPr>
+                  <a:t> </a:t>
+                </a:r>
+              </a:p>
+            </p:txBody>
+          </p:sp>
+        </mc:Fallback>
+      </mc:AlternateContent>
+    </p:spTree>
+    <p:extLst>
+      <p:ext uri="{BB962C8B-B14F-4D97-AF65-F5344CB8AC3E}">
+        <p14:creationId xmlns:p14="http://schemas.microsoft.com/office/powerpoint/2010/main" val="4136201450"/>
       </p:ext>
     </p:extLst>
   </p:cSld>
@@ -14764,382 +14679,6 @@
           </a:prstGeom>
         </p:spPr>
       </p:pic>
-      <p:pic>
-        <p:nvPicPr>
-          <p:cNvPr id="8201" name="Picture 9">
-            <a:extLst>
-              <a:ext uri="{FF2B5EF4-FFF2-40B4-BE49-F238E27FC236}">
-                <a16:creationId xmlns:a16="http://schemas.microsoft.com/office/drawing/2014/main" id="{36375530-44AD-4A95-A28C-9DC364940468}"/>
-              </a:ext>
-            </a:extLst>
-          </p:cNvPr>
-          <p:cNvPicPr>
-            <a:picLocks noChangeAspect="1" noChangeArrowheads="1"/>
-          </p:cNvPicPr>
-          <p:nvPr/>
-        </p:nvPicPr>
-        <p:blipFill>
-          <a:blip r:embed="rId4">
-            <a:extLst>
-              <a:ext uri="{28A0092B-C50C-407E-A947-70E740481C1C}">
-                <a14:useLocalDpi xmlns:a14="http://schemas.microsoft.com/office/drawing/2010/main" val="0"/>
-              </a:ext>
-            </a:extLst>
-          </a:blip>
-          <a:srcRect/>
-          <a:stretch>
-            <a:fillRect/>
-          </a:stretch>
-        </p:blipFill>
-        <p:spPr bwMode="auto">
-          <a:xfrm>
-            <a:off x="0" y="0"/>
-            <a:ext cx="657225" cy="190500"/>
-          </a:xfrm>
-          <a:prstGeom prst="rect">
-            <a:avLst/>
-          </a:prstGeom>
-          <a:noFill/>
-          <a:extLst>
-            <a:ext uri="{909E8E84-426E-40DD-AFC4-6F175D3DCCD1}">
-              <a14:hiddenFill xmlns:a14="http://schemas.microsoft.com/office/drawing/2010/main">
-                <a:solidFill>
-                  <a:srgbClr val="FFFFFF"/>
-                </a:solidFill>
-              </a14:hiddenFill>
-            </a:ext>
-          </a:extLst>
-        </p:spPr>
-      </p:pic>
-      <p:pic>
-        <p:nvPicPr>
-          <p:cNvPr id="8200" name="Picture 8">
-            <a:extLst>
-              <a:ext uri="{FF2B5EF4-FFF2-40B4-BE49-F238E27FC236}">
-                <a16:creationId xmlns:a16="http://schemas.microsoft.com/office/drawing/2014/main" id="{12BA2B2D-B512-475B-8697-556AF86A0529}"/>
-              </a:ext>
-            </a:extLst>
-          </p:cNvPr>
-          <p:cNvPicPr>
-            <a:picLocks noChangeAspect="1" noChangeArrowheads="1"/>
-          </p:cNvPicPr>
-          <p:nvPr/>
-        </p:nvPicPr>
-        <p:blipFill>
-          <a:blip r:embed="rId5">
-            <a:extLst>
-              <a:ext uri="{28A0092B-C50C-407E-A947-70E740481C1C}">
-                <a14:useLocalDpi xmlns:a14="http://schemas.microsoft.com/office/drawing/2010/main" val="0"/>
-              </a:ext>
-            </a:extLst>
-          </a:blip>
-          <a:srcRect/>
-          <a:stretch>
-            <a:fillRect/>
-          </a:stretch>
-        </p:blipFill>
-        <p:spPr bwMode="auto">
-          <a:xfrm>
-            <a:off x="0" y="0"/>
-            <a:ext cx="723900" cy="190500"/>
-          </a:xfrm>
-          <a:prstGeom prst="rect">
-            <a:avLst/>
-          </a:prstGeom>
-          <a:noFill/>
-          <a:extLst>
-            <a:ext uri="{909E8E84-426E-40DD-AFC4-6F175D3DCCD1}">
-              <a14:hiddenFill xmlns:a14="http://schemas.microsoft.com/office/drawing/2010/main">
-                <a:solidFill>
-                  <a:srgbClr val="FFFFFF"/>
-                </a:solidFill>
-              </a14:hiddenFill>
-            </a:ext>
-          </a:extLst>
-        </p:spPr>
-      </p:pic>
-      <p:pic>
-        <p:nvPicPr>
-          <p:cNvPr id="8199" name="Picture 7">
-            <a:extLst>
-              <a:ext uri="{FF2B5EF4-FFF2-40B4-BE49-F238E27FC236}">
-                <a16:creationId xmlns:a16="http://schemas.microsoft.com/office/drawing/2014/main" id="{9F209AAE-114D-4DEF-AD75-53F79A481702}"/>
-              </a:ext>
-            </a:extLst>
-          </p:cNvPr>
-          <p:cNvPicPr>
-            <a:picLocks noChangeAspect="1" noChangeArrowheads="1"/>
-          </p:cNvPicPr>
-          <p:nvPr/>
-        </p:nvPicPr>
-        <p:blipFill>
-          <a:blip r:embed="rId6">
-            <a:extLst>
-              <a:ext uri="{28A0092B-C50C-407E-A947-70E740481C1C}">
-                <a14:useLocalDpi xmlns:a14="http://schemas.microsoft.com/office/drawing/2010/main" val="0"/>
-              </a:ext>
-            </a:extLst>
-          </a:blip>
-          <a:srcRect/>
-          <a:stretch>
-            <a:fillRect/>
-          </a:stretch>
-        </p:blipFill>
-        <p:spPr bwMode="auto">
-          <a:xfrm>
-            <a:off x="0" y="0"/>
-            <a:ext cx="1704975" cy="190500"/>
-          </a:xfrm>
-          <a:prstGeom prst="rect">
-            <a:avLst/>
-          </a:prstGeom>
-          <a:noFill/>
-          <a:extLst>
-            <a:ext uri="{909E8E84-426E-40DD-AFC4-6F175D3DCCD1}">
-              <a14:hiddenFill xmlns:a14="http://schemas.microsoft.com/office/drawing/2010/main">
-                <a:solidFill>
-                  <a:srgbClr val="FFFFFF"/>
-                </a:solidFill>
-              </a14:hiddenFill>
-            </a:ext>
-          </a:extLst>
-        </p:spPr>
-      </p:pic>
-      <p:pic>
-        <p:nvPicPr>
-          <p:cNvPr id="8198" name="Picture 6">
-            <a:extLst>
-              <a:ext uri="{FF2B5EF4-FFF2-40B4-BE49-F238E27FC236}">
-                <a16:creationId xmlns:a16="http://schemas.microsoft.com/office/drawing/2014/main" id="{2892D845-CAB8-4C60-A17D-FFD68CFAD4E7}"/>
-              </a:ext>
-            </a:extLst>
-          </p:cNvPr>
-          <p:cNvPicPr>
-            <a:picLocks noChangeAspect="1" noChangeArrowheads="1"/>
-          </p:cNvPicPr>
-          <p:nvPr/>
-        </p:nvPicPr>
-        <p:blipFill>
-          <a:blip r:embed="rId7">
-            <a:extLst>
-              <a:ext uri="{28A0092B-C50C-407E-A947-70E740481C1C}">
-                <a14:useLocalDpi xmlns:a14="http://schemas.microsoft.com/office/drawing/2010/main" val="0"/>
-              </a:ext>
-            </a:extLst>
-          </a:blip>
-          <a:srcRect/>
-          <a:stretch>
-            <a:fillRect/>
-          </a:stretch>
-        </p:blipFill>
-        <p:spPr bwMode="auto">
-          <a:xfrm>
-            <a:off x="0" y="0"/>
-            <a:ext cx="847725" cy="190500"/>
-          </a:xfrm>
-          <a:prstGeom prst="rect">
-            <a:avLst/>
-          </a:prstGeom>
-          <a:noFill/>
-          <a:extLst>
-            <a:ext uri="{909E8E84-426E-40DD-AFC4-6F175D3DCCD1}">
-              <a14:hiddenFill xmlns:a14="http://schemas.microsoft.com/office/drawing/2010/main">
-                <a:solidFill>
-                  <a:srgbClr val="FFFFFF"/>
-                </a:solidFill>
-              </a14:hiddenFill>
-            </a:ext>
-          </a:extLst>
-        </p:spPr>
-      </p:pic>
-      <p:pic>
-        <p:nvPicPr>
-          <p:cNvPr id="8205" name="Picture 13">
-            <a:extLst>
-              <a:ext uri="{FF2B5EF4-FFF2-40B4-BE49-F238E27FC236}">
-                <a16:creationId xmlns:a16="http://schemas.microsoft.com/office/drawing/2014/main" id="{52CA94D6-59F1-4D48-98BC-ADE03DBE9A12}"/>
-              </a:ext>
-            </a:extLst>
-          </p:cNvPr>
-          <p:cNvPicPr>
-            <a:picLocks noChangeAspect="1" noChangeArrowheads="1"/>
-          </p:cNvPicPr>
-          <p:nvPr/>
-        </p:nvPicPr>
-        <p:blipFill>
-          <a:blip r:embed="rId4">
-            <a:extLst>
-              <a:ext uri="{28A0092B-C50C-407E-A947-70E740481C1C}">
-                <a14:useLocalDpi xmlns:a14="http://schemas.microsoft.com/office/drawing/2010/main" val="0"/>
-              </a:ext>
-            </a:extLst>
-          </a:blip>
-          <a:srcRect/>
-          <a:stretch>
-            <a:fillRect/>
-          </a:stretch>
-        </p:blipFill>
-        <p:spPr bwMode="auto">
-          <a:xfrm>
-            <a:off x="0" y="0"/>
-            <a:ext cx="657225" cy="190500"/>
-          </a:xfrm>
-          <a:prstGeom prst="rect">
-            <a:avLst/>
-          </a:prstGeom>
-          <a:noFill/>
-          <a:extLst>
-            <a:ext uri="{909E8E84-426E-40DD-AFC4-6F175D3DCCD1}">
-              <a14:hiddenFill xmlns:a14="http://schemas.microsoft.com/office/drawing/2010/main">
-                <a:solidFill>
-                  <a:srgbClr val="FFFFFF"/>
-                </a:solidFill>
-              </a14:hiddenFill>
-            </a:ext>
-          </a:extLst>
-        </p:spPr>
-      </p:pic>
-      <p:pic>
-        <p:nvPicPr>
-          <p:cNvPr id="8204" name="Picture 12">
-            <a:extLst>
-              <a:ext uri="{FF2B5EF4-FFF2-40B4-BE49-F238E27FC236}">
-                <a16:creationId xmlns:a16="http://schemas.microsoft.com/office/drawing/2014/main" id="{6E9B276D-4A48-4A29-8C75-CC3B8CB426CE}"/>
-              </a:ext>
-            </a:extLst>
-          </p:cNvPr>
-          <p:cNvPicPr>
-            <a:picLocks noChangeAspect="1" noChangeArrowheads="1"/>
-          </p:cNvPicPr>
-          <p:nvPr/>
-        </p:nvPicPr>
-        <p:blipFill>
-          <a:blip r:embed="rId5">
-            <a:extLst>
-              <a:ext uri="{28A0092B-C50C-407E-A947-70E740481C1C}">
-                <a14:useLocalDpi xmlns:a14="http://schemas.microsoft.com/office/drawing/2010/main" val="0"/>
-              </a:ext>
-            </a:extLst>
-          </a:blip>
-          <a:srcRect/>
-          <a:stretch>
-            <a:fillRect/>
-          </a:stretch>
-        </p:blipFill>
-        <p:spPr bwMode="auto">
-          <a:xfrm>
-            <a:off x="0" y="0"/>
-            <a:ext cx="723900" cy="190500"/>
-          </a:xfrm>
-          <a:prstGeom prst="rect">
-            <a:avLst/>
-          </a:prstGeom>
-          <a:noFill/>
-          <a:extLst>
-            <a:ext uri="{909E8E84-426E-40DD-AFC4-6F175D3DCCD1}">
-              <a14:hiddenFill xmlns:a14="http://schemas.microsoft.com/office/drawing/2010/main">
-                <a:solidFill>
-                  <a:srgbClr val="FFFFFF"/>
-                </a:solidFill>
-              </a14:hiddenFill>
-            </a:ext>
-          </a:extLst>
-        </p:spPr>
-      </p:pic>
-      <p:pic>
-        <p:nvPicPr>
-          <p:cNvPr id="8203" name="Picture 11">
-            <a:extLst>
-              <a:ext uri="{FF2B5EF4-FFF2-40B4-BE49-F238E27FC236}">
-                <a16:creationId xmlns:a16="http://schemas.microsoft.com/office/drawing/2014/main" id="{539C65E6-8BD1-4AA4-BCB5-A535F08FB306}"/>
-              </a:ext>
-            </a:extLst>
-          </p:cNvPr>
-          <p:cNvPicPr>
-            <a:picLocks noChangeAspect="1" noChangeArrowheads="1"/>
-          </p:cNvPicPr>
-          <p:nvPr/>
-        </p:nvPicPr>
-        <p:blipFill>
-          <a:blip r:embed="rId6">
-            <a:extLst>
-              <a:ext uri="{28A0092B-C50C-407E-A947-70E740481C1C}">
-                <a14:useLocalDpi xmlns:a14="http://schemas.microsoft.com/office/drawing/2010/main" val="0"/>
-              </a:ext>
-            </a:extLst>
-          </a:blip>
-          <a:srcRect/>
-          <a:stretch>
-            <a:fillRect/>
-          </a:stretch>
-        </p:blipFill>
-        <p:spPr bwMode="auto">
-          <a:xfrm>
-            <a:off x="0" y="0"/>
-            <a:ext cx="1704975" cy="190500"/>
-          </a:xfrm>
-          <a:prstGeom prst="rect">
-            <a:avLst/>
-          </a:prstGeom>
-          <a:noFill/>
-          <a:extLst>
-            <a:ext uri="{909E8E84-426E-40DD-AFC4-6F175D3DCCD1}">
-              <a14:hiddenFill xmlns:a14="http://schemas.microsoft.com/office/drawing/2010/main">
-                <a:solidFill>
-                  <a:srgbClr val="FFFFFF"/>
-                </a:solidFill>
-              </a14:hiddenFill>
-            </a:ext>
-          </a:extLst>
-        </p:spPr>
-      </p:pic>
-      <p:pic>
-        <p:nvPicPr>
-          <p:cNvPr id="8202" name="Picture 10">
-            <a:extLst>
-              <a:ext uri="{FF2B5EF4-FFF2-40B4-BE49-F238E27FC236}">
-                <a16:creationId xmlns:a16="http://schemas.microsoft.com/office/drawing/2014/main" id="{C66F8EE1-FF09-423A-839D-35FDE206E5E7}"/>
-              </a:ext>
-            </a:extLst>
-          </p:cNvPr>
-          <p:cNvPicPr>
-            <a:picLocks noChangeAspect="1" noChangeArrowheads="1"/>
-          </p:cNvPicPr>
-          <p:nvPr/>
-        </p:nvPicPr>
-        <p:blipFill>
-          <a:blip r:embed="rId7">
-            <a:extLst>
-              <a:ext uri="{28A0092B-C50C-407E-A947-70E740481C1C}">
-                <a14:useLocalDpi xmlns:a14="http://schemas.microsoft.com/office/drawing/2010/main" val="0"/>
-              </a:ext>
-            </a:extLst>
-          </a:blip>
-          <a:srcRect/>
-          <a:stretch>
-            <a:fillRect/>
-          </a:stretch>
-        </p:blipFill>
-        <p:spPr bwMode="auto">
-          <a:xfrm>
-            <a:off x="0" y="0"/>
-            <a:ext cx="847725" cy="190500"/>
-          </a:xfrm>
-          <a:prstGeom prst="rect">
-            <a:avLst/>
-          </a:prstGeom>
-          <a:noFill/>
-          <a:extLst>
-            <a:ext uri="{909E8E84-426E-40DD-AFC4-6F175D3DCCD1}">
-              <a14:hiddenFill xmlns:a14="http://schemas.microsoft.com/office/drawing/2010/main">
-                <a:solidFill>
-                  <a:srgbClr val="FFFFFF"/>
-                </a:solidFill>
-              </a14:hiddenFill>
-            </a:ext>
-          </a:extLst>
-        </p:spPr>
-      </p:pic>
     </p:spTree>
     <p:extLst>
       <p:ext uri="{BB962C8B-B14F-4D97-AF65-F5344CB8AC3E}">
@@ -15681,7 +15220,23 @@
           <a:p>
             <a:r>
               <a:rPr lang="en-US" sz="2200" dirty="0"/>
-              <a:t>The total running time of the algorithm in our IP for the example described in section ‎4.2.1 was of 167*10^7 [</a:t>
+              <a:t>The total running time of the algorithm in our IP for the </a:t>
+            </a:r>
+            <a:r>
+              <a:rPr lang="he-IL" sz="2200" dirty="0"/>
+              <a:t>"</a:t>
+            </a:r>
+            <a:r>
+              <a:rPr lang="en-US" sz="2200" dirty="0"/>
+              <a:t>Sanity check</a:t>
+            </a:r>
+            <a:r>
+              <a:rPr lang="he-IL" sz="2200" dirty="0"/>
+              <a:t>"</a:t>
+            </a:r>
+            <a:r>
+              <a:rPr lang="en-US" sz="2200" dirty="0"/>
+              <a:t> test was of 167*10^7 [</a:t>
             </a:r>
             <a:r>
               <a:rPr lang="en-US" sz="2200" dirty="0" err="1"/>
@@ -15757,7 +15312,23 @@
             </a:r>
             <a:r>
               <a:rPr lang="en-US" sz="2200" dirty="0"/>
-              <a:t> script used to verified the correctness of the output for input example described in section ‎4.2.1 took approximately 1.68 [sec], meaning the speedup for the algorithm using the IP was of 1.34*10^6. </a:t>
+              <a:t> script used to verified the correctness of the output for input for the </a:t>
+            </a:r>
+            <a:r>
+              <a:rPr lang="he-IL" sz="2200" dirty="0"/>
+              <a:t>"</a:t>
+            </a:r>
+            <a:r>
+              <a:rPr lang="en-US" sz="2200" dirty="0"/>
+              <a:t>Sanity check</a:t>
+            </a:r>
+            <a:r>
+              <a:rPr lang="he-IL" sz="2200" dirty="0"/>
+              <a:t>"</a:t>
+            </a:r>
+            <a:r>
+              <a:rPr lang="en-US" sz="2200" dirty="0"/>
+              <a:t> test took approximately 1.68 [sec], meaning the speedup for the algorithm using the IP was of 1.34*10^6. </a:t>
             </a:r>
           </a:p>
           <a:p>

</xml_diff>

<commit_message>
changes to final ppt3
</commit_message>
<xml_diff>
--- a/Final presentation_v3.pptx
+++ b/Final presentation_v3.pptx
@@ -238,7 +238,7 @@
           <a:p>
             <a:fld id="{B3E803FA-11BA-4290-A53C-9700EB796447}" type="datetimeFigureOut">
               <a:rPr lang="he-IL" smtClean="0"/>
-              <a:t>כ"ט/סיון/תש"ף</a:t>
+              <a:t>ל'/סיון/תש"ף</a:t>
             </a:fld>
             <a:endParaRPr lang="he-IL"/>
           </a:p>
@@ -4805,7 +4805,7 @@
           <a:p>
             <a:fld id="{48A87A34-81AB-432B-8DAE-1953F412C126}" type="datetimeFigureOut">
               <a:rPr lang="en-US" smtClean="0"/>
-              <a:t>6/21/2020</a:t>
+              <a:t>6/22/2020</a:t>
             </a:fld>
             <a:endParaRPr lang="en-US" dirty="0"/>
           </a:p>
@@ -5003,7 +5003,7 @@
           <a:p>
             <a:fld id="{48A87A34-81AB-432B-8DAE-1953F412C126}" type="datetimeFigureOut">
               <a:rPr lang="en-US" smtClean="0"/>
-              <a:t>6/21/2020</a:t>
+              <a:t>6/22/2020</a:t>
             </a:fld>
             <a:endParaRPr lang="en-US" dirty="0"/>
           </a:p>
@@ -5211,7 +5211,7 @@
           <a:p>
             <a:fld id="{48A87A34-81AB-432B-8DAE-1953F412C126}" type="datetimeFigureOut">
               <a:rPr lang="en-US" smtClean="0"/>
-              <a:t>6/21/2020</a:t>
+              <a:t>6/22/2020</a:t>
             </a:fld>
             <a:endParaRPr lang="en-US" dirty="0"/>
           </a:p>
@@ -5409,7 +5409,7 @@
           <a:p>
             <a:fld id="{48A87A34-81AB-432B-8DAE-1953F412C126}" type="datetimeFigureOut">
               <a:rPr lang="en-US" smtClean="0"/>
-              <a:t>6/21/2020</a:t>
+              <a:t>6/22/2020</a:t>
             </a:fld>
             <a:endParaRPr lang="en-US" dirty="0"/>
           </a:p>
@@ -5684,7 +5684,7 @@
           <a:p>
             <a:fld id="{48A87A34-81AB-432B-8DAE-1953F412C126}" type="datetimeFigureOut">
               <a:rPr lang="en-US" smtClean="0"/>
-              <a:t>6/21/2020</a:t>
+              <a:t>6/22/2020</a:t>
             </a:fld>
             <a:endParaRPr lang="en-US" dirty="0"/>
           </a:p>
@@ -5949,7 +5949,7 @@
           <a:p>
             <a:fld id="{48A87A34-81AB-432B-8DAE-1953F412C126}" type="datetimeFigureOut">
               <a:rPr lang="en-US" smtClean="0"/>
-              <a:t>6/21/2020</a:t>
+              <a:t>6/22/2020</a:t>
             </a:fld>
             <a:endParaRPr lang="en-US" dirty="0"/>
           </a:p>
@@ -6361,7 +6361,7 @@
           <a:p>
             <a:fld id="{48A87A34-81AB-432B-8DAE-1953F412C126}" type="datetimeFigureOut">
               <a:rPr lang="en-US" smtClean="0"/>
-              <a:t>6/21/2020</a:t>
+              <a:t>6/22/2020</a:t>
             </a:fld>
             <a:endParaRPr lang="en-US" dirty="0"/>
           </a:p>
@@ -6502,7 +6502,7 @@
           <a:p>
             <a:fld id="{48A87A34-81AB-432B-8DAE-1953F412C126}" type="datetimeFigureOut">
               <a:rPr lang="en-US" smtClean="0"/>
-              <a:t>6/21/2020</a:t>
+              <a:t>6/22/2020</a:t>
             </a:fld>
             <a:endParaRPr lang="en-US" dirty="0"/>
           </a:p>
@@ -6615,7 +6615,7 @@
           <a:p>
             <a:fld id="{48A87A34-81AB-432B-8DAE-1953F412C126}" type="datetimeFigureOut">
               <a:rPr lang="en-US" smtClean="0"/>
-              <a:t>6/21/2020</a:t>
+              <a:t>6/22/2020</a:t>
             </a:fld>
             <a:endParaRPr lang="en-US" dirty="0"/>
           </a:p>
@@ -6926,7 +6926,7 @@
           <a:p>
             <a:fld id="{48A87A34-81AB-432B-8DAE-1953F412C126}" type="datetimeFigureOut">
               <a:rPr lang="en-US" smtClean="0"/>
-              <a:t>6/21/2020</a:t>
+              <a:t>6/22/2020</a:t>
             </a:fld>
             <a:endParaRPr lang="en-US" dirty="0"/>
           </a:p>
@@ -7214,7 +7214,7 @@
           <a:p>
             <a:fld id="{48A87A34-81AB-432B-8DAE-1953F412C126}" type="datetimeFigureOut">
               <a:rPr lang="en-US" smtClean="0"/>
-              <a:t>6/21/2020</a:t>
+              <a:t>6/22/2020</a:t>
             </a:fld>
             <a:endParaRPr lang="en-US" dirty="0"/>
           </a:p>
@@ -7456,7 +7456,7 @@
             <a:fld id="{48A87A34-81AB-432B-8DAE-1953F412C126}" type="datetimeFigureOut">
               <a:rPr lang="en-US" smtClean="0"/>
               <a:pPr/>
-              <a:t>6/21/2020</a:t>
+              <a:t>6/22/2020</a:t>
             </a:fld>
             <a:endParaRPr lang="en-US" dirty="0"/>
           </a:p>
@@ -10950,8 +10950,8 @@
           <a:chExt cx="0" cy="0"/>
         </a:xfrm>
       </p:grpSpPr>
-      <mc:AlternateContent xmlns:mc="http://schemas.openxmlformats.org/markup-compatibility/2006" xmlns:a14="http://schemas.microsoft.com/office/drawing/2010/main">
-        <mc:Choice Requires="a14">
+      <mc:AlternateContent xmlns:mc="http://schemas.openxmlformats.org/markup-compatibility/2006">
+        <mc:Choice xmlns:a14="http://schemas.microsoft.com/office/drawing/2010/main" Requires="a14">
           <p:sp>
             <p:nvSpPr>
               <p:cNvPr id="3" name="מציין מיקום תוכן 2">
@@ -10981,8 +10981,20 @@
               <a:lstStyle/>
               <a:p>
                 <a:r>
+                  <a:rPr lang="en-US" sz="2000" b="1" dirty="0"/>
+                  <a:t>Three clock </a:t>
+                </a:r>
+                <a:r>
                   <a:rPr lang="en-US" sz="2000" dirty="0"/>
-                  <a:t>Three clock cycles are needed to fill this module pipeline.</a:t>
+                  <a:t>cycles are needed to </a:t>
+                </a:r>
+                <a:r>
+                  <a:rPr lang="en-US" sz="2000" b="1" dirty="0"/>
+                  <a:t>fill </a:t>
+                </a:r>
+                <a:r>
+                  <a:rPr lang="en-US" sz="2000" dirty="0"/>
+                  <a:t>this module pipeline.</a:t>
                 </a:r>
               </a:p>
               <a:p>
@@ -10994,7 +11006,23 @@
               <a:p>
                 <a:r>
                   <a:rPr lang="en-US" sz="2000" dirty="0"/>
-                  <a:t>So the throughput  is of one new point classification per cycle. </a:t>
+                  <a:t>So the </a:t>
+                </a:r>
+                <a:r>
+                  <a:rPr lang="en-US" sz="2000" b="1" dirty="0"/>
+                  <a:t>throughput</a:t>
+                </a:r>
+                <a:r>
+                  <a:rPr lang="en-US" sz="2000" dirty="0"/>
+                  <a:t>  is of </a:t>
+                </a:r>
+                <a:r>
+                  <a:rPr lang="en-US" sz="2000" b="1" dirty="0"/>
+                  <a:t>one new point classification per cycle</a:t>
+                </a:r>
+                <a:r>
+                  <a:rPr lang="en-US" sz="2000" dirty="0"/>
+                  <a:t>. </a:t>
                 </a:r>
               </a:p>
               <a:p>
@@ -11273,7 +11301,7 @@
             </p:txBody>
           </p:sp>
         </mc:Choice>
-        <mc:Fallback xmlns="">
+        <mc:Fallback>
           <p:sp>
             <p:nvSpPr>
               <p:cNvPr id="3" name="מציין מיקום תוכן 2">
@@ -11907,8 +11935,8 @@
           <a:chExt cx="0" cy="0"/>
         </a:xfrm>
       </p:grpSpPr>
-      <mc:AlternateContent xmlns:mc="http://schemas.openxmlformats.org/markup-compatibility/2006" xmlns:a14="http://schemas.microsoft.com/office/drawing/2010/main">
-        <mc:Choice Requires="a14">
+      <mc:AlternateContent xmlns:mc="http://schemas.openxmlformats.org/markup-compatibility/2006">
+        <mc:Choice xmlns:a14="http://schemas.microsoft.com/office/drawing/2010/main" Requires="a14">
           <p:sp>
             <p:nvSpPr>
               <p:cNvPr id="3" name="מציין מיקום תוכן 2">
@@ -11939,7 +11967,19 @@
               <a:p>
                 <a:r>
                   <a:rPr lang="en-US" sz="2000" dirty="0"/>
-                  <a:t>Requires one clock cycle to be filled</a:t>
+                  <a:t>Requires </a:t>
+                </a:r>
+                <a:r>
+                  <a:rPr lang="en-US" sz="2000" b="1" dirty="0"/>
+                  <a:t>one clock </a:t>
+                </a:r>
+                <a:r>
+                  <a:rPr lang="en-US" sz="2000" dirty="0"/>
+                  <a:t>cycle to be </a:t>
+                </a:r>
+                <a:r>
+                  <a:rPr lang="en-US" sz="2000" b="1" dirty="0"/>
+                  <a:t>filled</a:t>
                 </a:r>
               </a:p>
               <a:p>
@@ -11956,8 +11996,28 @@
               </a:p>
               <a:p>
                 <a:r>
+                  <a:rPr lang="en-US" sz="2000" b="1" dirty="0"/>
+                  <a:t>Throughput</a:t>
+                </a:r>
+                <a:r>
                   <a:rPr lang="en-US" sz="2000" dirty="0"/>
-                  <a:t>Throughput of one new centroid calculation and convergence check per cycle</a:t>
+                  <a:t> of </a:t>
+                </a:r>
+                <a:r>
+                  <a:rPr lang="en-US" sz="2000" b="1" dirty="0"/>
+                  <a:t>one</a:t>
+                </a:r>
+                <a:r>
+                  <a:rPr lang="en-US" sz="2000" dirty="0"/>
+                  <a:t> new </a:t>
+                </a:r>
+                <a:r>
+                  <a:rPr lang="en-US" sz="2000" b="1" dirty="0"/>
+                  <a:t>centroid</a:t>
+                </a:r>
+                <a:r>
+                  <a:rPr lang="en-US" sz="2000" dirty="0"/>
+                  <a:t> calculation and convergence check per cycle</a:t>
                 </a:r>
               </a:p>
               <a:p>
@@ -12234,7 +12294,7 @@
             </p:txBody>
           </p:sp>
         </mc:Choice>
-        <mc:Fallback xmlns="">
+        <mc:Fallback>
           <p:sp>
             <p:nvSpPr>
               <p:cNvPr id="3" name="מציין מיקום תוכן 2">
@@ -12450,8 +12510,8 @@
           </a:p>
         </p:txBody>
       </p:sp>
-      <mc:AlternateContent xmlns:mc="http://schemas.openxmlformats.org/markup-compatibility/2006">
-        <mc:Choice xmlns:a14="http://schemas.microsoft.com/office/drawing/2010/main" Requires="a14">
+      <mc:AlternateContent xmlns:mc="http://schemas.openxmlformats.org/markup-compatibility/2006" xmlns:a14="http://schemas.microsoft.com/office/drawing/2010/main">
+        <mc:Choice Requires="a14">
           <p:sp>
             <p:nvSpPr>
               <p:cNvPr id="2" name="Rectangle 1">
@@ -12479,6 +12539,7 @@
               </a:bodyPr>
               <a:lstStyle/>
               <a:p>
+                <a:pPr/>
                 <a14:m>
                   <m:oMathPara xmlns:m="http://schemas.openxmlformats.org/officeDocument/2006/math">
                     <m:oMathParaPr>
@@ -12486,131 +12547,189 @@
                     </m:oMathParaPr>
                     <m:oMath xmlns:m="http://schemas.openxmlformats.org/officeDocument/2006/math">
                       <m:r>
-                        <a:rPr lang="en-US" sz="2400" i="1"/>
+                        <a:rPr lang="en-US" sz="2400" i="1">
+                          <a:latin typeface="Cambria Math" panose="02040503050406030204" pitchFamily="18" charset="0"/>
+                        </a:rPr>
                         <m:t>𝑙𝑎𝑡𝑒𝑛𝑐</m:t>
                       </m:r>
                       <m:sSub>
                         <m:sSubPr>
                           <m:ctrlPr>
-                            <a:rPr lang="en-US" sz="2400" i="1"/>
+                            <a:rPr lang="en-US" sz="2400" i="1">
+                              <a:latin typeface="Cambria Math" panose="02040503050406030204" pitchFamily="18" charset="0"/>
+                            </a:rPr>
                           </m:ctrlPr>
                         </m:sSubPr>
                         <m:e>
                           <m:r>
-                            <a:rPr lang="en-US" sz="2400" i="1"/>
+                            <a:rPr lang="en-US" sz="2400" i="1">
+                              <a:latin typeface="Cambria Math" panose="02040503050406030204" pitchFamily="18" charset="0"/>
+                            </a:rPr>
                             <m:t>𝑦</m:t>
                           </m:r>
                         </m:e>
                         <m:sub>
                           <m:r>
-                            <a:rPr lang="en-US" sz="2400" i="1"/>
+                            <a:rPr lang="en-US" sz="2400" i="1">
+                              <a:latin typeface="Cambria Math" panose="02040503050406030204" pitchFamily="18" charset="0"/>
+                            </a:rPr>
                             <m:t>𝑝𝑖𝑝𝑒</m:t>
                           </m:r>
                           <m:r>
-                            <a:rPr lang="en-US" sz="2400" i="1"/>
+                            <a:rPr lang="en-US" sz="2400" i="1">
+                              <a:latin typeface="Cambria Math" panose="02040503050406030204" pitchFamily="18" charset="0"/>
+                            </a:rPr>
                             <m:t>2</m:t>
                           </m:r>
                         </m:sub>
                       </m:sSub>
                       <m:r>
-                        <a:rPr lang="en-US" sz="2400" i="1"/>
+                        <a:rPr lang="en-US" sz="2400" i="1">
+                          <a:latin typeface="Cambria Math" panose="02040503050406030204" pitchFamily="18" charset="0"/>
+                        </a:rPr>
                         <m:t>=</m:t>
                       </m:r>
                       <m:r>
-                        <a:rPr lang="en-US" sz="2400" i="1"/>
+                        <a:rPr lang="en-US" sz="2400" i="1">
+                          <a:latin typeface="Cambria Math" panose="02040503050406030204" pitchFamily="18" charset="0"/>
+                        </a:rPr>
                         <m:t>1</m:t>
                       </m:r>
                       <m:r>
-                        <a:rPr lang="en-US" sz="2400" i="1"/>
+                        <a:rPr lang="en-US" sz="2400" i="1">
+                          <a:latin typeface="Cambria Math" panose="02040503050406030204" pitchFamily="18" charset="0"/>
+                        </a:rPr>
                         <m:t>+</m:t>
                       </m:r>
                       <m:d>
                         <m:dPr>
                           <m:ctrlPr>
-                            <a:rPr lang="en-US" sz="2400" i="1"/>
+                            <a:rPr lang="en-US" sz="2400" i="1">
+                              <a:latin typeface="Cambria Math" panose="02040503050406030204" pitchFamily="18" charset="0"/>
+                            </a:rPr>
                           </m:ctrlPr>
                         </m:dPr>
                         <m:e>
                           <m:r>
-                            <a:rPr lang="en-US" sz="2400" i="1"/>
+                            <a:rPr lang="en-US" sz="2400" i="1">
+                              <a:latin typeface="Cambria Math" panose="02040503050406030204" pitchFamily="18" charset="0"/>
+                            </a:rPr>
                             <m:t>𝑛𝑢𝑚𝑏𝑒𝑟</m:t>
                           </m:r>
                           <m:r>
-                            <a:rPr lang="en-US" sz="2400" i="1"/>
+                            <a:rPr lang="en-US" sz="2400" i="1">
+                              <a:latin typeface="Cambria Math" panose="02040503050406030204" pitchFamily="18" charset="0"/>
+                            </a:rPr>
                             <m:t> </m:t>
                           </m:r>
                           <m:r>
-                            <a:rPr lang="en-US" sz="2400" i="1"/>
+                            <a:rPr lang="en-US" sz="2400" i="1">
+                              <a:latin typeface="Cambria Math" panose="02040503050406030204" pitchFamily="18" charset="0"/>
+                            </a:rPr>
                             <m:t>𝑜𝑓</m:t>
                           </m:r>
                           <m:r>
-                            <a:rPr lang="en-US" sz="2400" i="1"/>
+                            <a:rPr lang="en-US" sz="2400" i="1">
+                              <a:latin typeface="Cambria Math" panose="02040503050406030204" pitchFamily="18" charset="0"/>
+                            </a:rPr>
                             <m:t> </m:t>
                           </m:r>
                           <m:r>
-                            <a:rPr lang="en-US" sz="2400" i="1"/>
+                            <a:rPr lang="en-US" sz="2400" i="1">
+                              <a:latin typeface="Cambria Math" panose="02040503050406030204" pitchFamily="18" charset="0"/>
+                            </a:rPr>
                             <m:t>𝑐𝑒𝑛𝑡𝑟𝑜𝑖𝑑𝑠</m:t>
                           </m:r>
                         </m:e>
                       </m:d>
                       <m:r>
-                        <a:rPr lang="en-US" sz="2400" i="1"/>
+                        <a:rPr lang="en-US" sz="2400" i="1">
+                          <a:latin typeface="Cambria Math" panose="02040503050406030204" pitchFamily="18" charset="0"/>
+                        </a:rPr>
                         <m:t>+</m:t>
                       </m:r>
                       <m:r>
-                        <a:rPr lang="en-US" sz="2400" i="1"/>
+                        <a:rPr lang="en-US" sz="2400" i="1">
+                          <a:latin typeface="Cambria Math" panose="02040503050406030204" pitchFamily="18" charset="0"/>
+                        </a:rPr>
                         <m:t>1</m:t>
                       </m:r>
                       <m:r>
-                        <a:rPr lang="en-US" sz="2400" i="1"/>
+                        <a:rPr lang="en-US" sz="2400" i="1">
+                          <a:latin typeface="Cambria Math" panose="02040503050406030204" pitchFamily="18" charset="0"/>
+                        </a:rPr>
                         <m:t>=</m:t>
                       </m:r>
                       <m:r>
-                        <a:rPr lang="en-US" sz="2400" i="1"/>
+                        <a:rPr lang="en-US" sz="2400" i="1">
+                          <a:latin typeface="Cambria Math" panose="02040503050406030204" pitchFamily="18" charset="0"/>
+                        </a:rPr>
                         <m:t>1</m:t>
                       </m:r>
                       <m:r>
-                        <a:rPr lang="en-US" sz="2400" i="1"/>
+                        <a:rPr lang="en-US" sz="2400" i="1">
+                          <a:latin typeface="Cambria Math" panose="02040503050406030204" pitchFamily="18" charset="0"/>
+                        </a:rPr>
                         <m:t>+</m:t>
                       </m:r>
                       <m:r>
-                        <a:rPr lang="en-US" sz="2400" i="1"/>
+                        <a:rPr lang="en-US" sz="2400" i="1">
+                          <a:latin typeface="Cambria Math" panose="02040503050406030204" pitchFamily="18" charset="0"/>
+                        </a:rPr>
                         <m:t>8</m:t>
                       </m:r>
                       <m:r>
-                        <a:rPr lang="en-US" sz="2400" i="1"/>
+                        <a:rPr lang="en-US" sz="2400" i="1">
+                          <a:latin typeface="Cambria Math" panose="02040503050406030204" pitchFamily="18" charset="0"/>
+                        </a:rPr>
                         <m:t>+</m:t>
                       </m:r>
                       <m:r>
-                        <a:rPr lang="en-US" sz="2400" i="1"/>
+                        <a:rPr lang="en-US" sz="2400" i="1">
+                          <a:latin typeface="Cambria Math" panose="02040503050406030204" pitchFamily="18" charset="0"/>
+                        </a:rPr>
                         <m:t>1</m:t>
                       </m:r>
                       <m:r>
-                        <a:rPr lang="en-US" sz="2400" i="1"/>
+                        <a:rPr lang="en-US" sz="2400" i="1">
+                          <a:latin typeface="Cambria Math" panose="02040503050406030204" pitchFamily="18" charset="0"/>
+                        </a:rPr>
                         <m:t>=</m:t>
                       </m:r>
                       <m:r>
-                        <a:rPr lang="en-US" sz="2400" i="1"/>
+                        <a:rPr lang="en-US" sz="2400" i="1">
+                          <a:latin typeface="Cambria Math" panose="02040503050406030204" pitchFamily="18" charset="0"/>
+                        </a:rPr>
                         <m:t>10</m:t>
                       </m:r>
                       <m:r>
-                        <a:rPr lang="en-US" sz="2400" i="1"/>
+                        <a:rPr lang="en-US" sz="2400" i="1">
+                          <a:latin typeface="Cambria Math" panose="02040503050406030204" pitchFamily="18" charset="0"/>
+                        </a:rPr>
                         <m:t> [</m:t>
                       </m:r>
                       <m:r>
-                        <a:rPr lang="en-US" sz="2400" i="1"/>
+                        <a:rPr lang="en-US" sz="2400" i="1">
+                          <a:latin typeface="Cambria Math" panose="02040503050406030204" pitchFamily="18" charset="0"/>
+                        </a:rPr>
                         <m:t>𝑐𝑙𝑜𝑐𝑘</m:t>
                       </m:r>
                       <m:r>
-                        <a:rPr lang="en-US" sz="2400" i="1"/>
+                        <a:rPr lang="en-US" sz="2400" i="1">
+                          <a:latin typeface="Cambria Math" panose="02040503050406030204" pitchFamily="18" charset="0"/>
+                        </a:rPr>
                         <m:t> </m:t>
                       </m:r>
                       <m:r>
-                        <a:rPr lang="en-US" sz="2400" i="1"/>
+                        <a:rPr lang="en-US" sz="2400" i="1">
+                          <a:latin typeface="Cambria Math" panose="02040503050406030204" pitchFamily="18" charset="0"/>
+                        </a:rPr>
                         <m:t>𝑐𝑦𝑐𝑙𝑒𝑠</m:t>
                       </m:r>
                       <m:r>
-                        <a:rPr lang="en-US" sz="2400" i="1"/>
+                        <a:rPr lang="en-US" sz="2400" i="1">
+                          <a:latin typeface="Cambria Math" panose="02040503050406030204" pitchFamily="18" charset="0"/>
+                        </a:rPr>
                         <m:t>]</m:t>
                       </m:r>
                     </m:oMath>
@@ -12619,13 +12738,12 @@
                 <a:endParaRPr lang="en-US" sz="2400" dirty="0"/>
               </a:p>
               <a:p>
-                <a:pPr/>
                 <a:endParaRPr lang="en-US" sz="2800" i="1" dirty="0"/>
               </a:p>
             </p:txBody>
           </p:sp>
         </mc:Choice>
-        <mc:Fallback>
+        <mc:Fallback xmlns="">
           <p:sp>
             <p:nvSpPr>
               <p:cNvPr id="2" name="Rectangle 1">

</xml_diff>

<commit_message>
little changes to ppt3 final 3
</commit_message>
<xml_diff>
--- a/Final presentation_v3.pptx
+++ b/Final presentation_v3.pptx
@@ -238,7 +238,7 @@
           <a:p>
             <a:fld id="{B3E803FA-11BA-4290-A53C-9700EB796447}" type="datetimeFigureOut">
               <a:rPr lang="he-IL" smtClean="0"/>
-              <a:t>ל'/סיון/תש"ף</a:t>
+              <a:t>ב'/תמוז/תש"ף</a:t>
             </a:fld>
             <a:endParaRPr lang="he-IL"/>
           </a:p>
@@ -4805,7 +4805,7 @@
           <a:p>
             <a:fld id="{48A87A34-81AB-432B-8DAE-1953F412C126}" type="datetimeFigureOut">
               <a:rPr lang="en-US" smtClean="0"/>
-              <a:t>6/22/2020</a:t>
+              <a:t>6/24/2020</a:t>
             </a:fld>
             <a:endParaRPr lang="en-US" dirty="0"/>
           </a:p>
@@ -5003,7 +5003,7 @@
           <a:p>
             <a:fld id="{48A87A34-81AB-432B-8DAE-1953F412C126}" type="datetimeFigureOut">
               <a:rPr lang="en-US" smtClean="0"/>
-              <a:t>6/22/2020</a:t>
+              <a:t>6/24/2020</a:t>
             </a:fld>
             <a:endParaRPr lang="en-US" dirty="0"/>
           </a:p>
@@ -5211,7 +5211,7 @@
           <a:p>
             <a:fld id="{48A87A34-81AB-432B-8DAE-1953F412C126}" type="datetimeFigureOut">
               <a:rPr lang="en-US" smtClean="0"/>
-              <a:t>6/22/2020</a:t>
+              <a:t>6/24/2020</a:t>
             </a:fld>
             <a:endParaRPr lang="en-US" dirty="0"/>
           </a:p>
@@ -5409,7 +5409,7 @@
           <a:p>
             <a:fld id="{48A87A34-81AB-432B-8DAE-1953F412C126}" type="datetimeFigureOut">
               <a:rPr lang="en-US" smtClean="0"/>
-              <a:t>6/22/2020</a:t>
+              <a:t>6/24/2020</a:t>
             </a:fld>
             <a:endParaRPr lang="en-US" dirty="0"/>
           </a:p>
@@ -5684,7 +5684,7 @@
           <a:p>
             <a:fld id="{48A87A34-81AB-432B-8DAE-1953F412C126}" type="datetimeFigureOut">
               <a:rPr lang="en-US" smtClean="0"/>
-              <a:t>6/22/2020</a:t>
+              <a:t>6/24/2020</a:t>
             </a:fld>
             <a:endParaRPr lang="en-US" dirty="0"/>
           </a:p>
@@ -5949,7 +5949,7 @@
           <a:p>
             <a:fld id="{48A87A34-81AB-432B-8DAE-1953F412C126}" type="datetimeFigureOut">
               <a:rPr lang="en-US" smtClean="0"/>
-              <a:t>6/22/2020</a:t>
+              <a:t>6/24/2020</a:t>
             </a:fld>
             <a:endParaRPr lang="en-US" dirty="0"/>
           </a:p>
@@ -6361,7 +6361,7 @@
           <a:p>
             <a:fld id="{48A87A34-81AB-432B-8DAE-1953F412C126}" type="datetimeFigureOut">
               <a:rPr lang="en-US" smtClean="0"/>
-              <a:t>6/22/2020</a:t>
+              <a:t>6/24/2020</a:t>
             </a:fld>
             <a:endParaRPr lang="en-US" dirty="0"/>
           </a:p>
@@ -6502,7 +6502,7 @@
           <a:p>
             <a:fld id="{48A87A34-81AB-432B-8DAE-1953F412C126}" type="datetimeFigureOut">
               <a:rPr lang="en-US" smtClean="0"/>
-              <a:t>6/22/2020</a:t>
+              <a:t>6/24/2020</a:t>
             </a:fld>
             <a:endParaRPr lang="en-US" dirty="0"/>
           </a:p>
@@ -6615,7 +6615,7 @@
           <a:p>
             <a:fld id="{48A87A34-81AB-432B-8DAE-1953F412C126}" type="datetimeFigureOut">
               <a:rPr lang="en-US" smtClean="0"/>
-              <a:t>6/22/2020</a:t>
+              <a:t>6/24/2020</a:t>
             </a:fld>
             <a:endParaRPr lang="en-US" dirty="0"/>
           </a:p>
@@ -6926,7 +6926,7 @@
           <a:p>
             <a:fld id="{48A87A34-81AB-432B-8DAE-1953F412C126}" type="datetimeFigureOut">
               <a:rPr lang="en-US" smtClean="0"/>
-              <a:t>6/22/2020</a:t>
+              <a:t>6/24/2020</a:t>
             </a:fld>
             <a:endParaRPr lang="en-US" dirty="0"/>
           </a:p>
@@ -7214,7 +7214,7 @@
           <a:p>
             <a:fld id="{48A87A34-81AB-432B-8DAE-1953F412C126}" type="datetimeFigureOut">
               <a:rPr lang="en-US" smtClean="0"/>
-              <a:t>6/22/2020</a:t>
+              <a:t>6/24/2020</a:t>
             </a:fld>
             <a:endParaRPr lang="en-US" dirty="0"/>
           </a:p>
@@ -7456,7 +7456,7 @@
             <a:fld id="{48A87A34-81AB-432B-8DAE-1953F412C126}" type="datetimeFigureOut">
               <a:rPr lang="en-US" smtClean="0"/>
               <a:pPr/>
-              <a:t>6/22/2020</a:t>
+              <a:t>6/24/2020</a:t>
             </a:fld>
             <a:endParaRPr lang="en-US" dirty="0"/>
           </a:p>
@@ -10950,8 +10950,8 @@
           <a:chExt cx="0" cy="0"/>
         </a:xfrm>
       </p:grpSpPr>
-      <mc:AlternateContent xmlns:mc="http://schemas.openxmlformats.org/markup-compatibility/2006">
-        <mc:Choice xmlns:a14="http://schemas.microsoft.com/office/drawing/2010/main" Requires="a14">
+      <mc:AlternateContent xmlns:mc="http://schemas.openxmlformats.org/markup-compatibility/2006" xmlns:a14="http://schemas.microsoft.com/office/drawing/2010/main">
+        <mc:Choice Requires="a14">
           <p:sp>
             <p:nvSpPr>
               <p:cNvPr id="3" name="מציין מיקום תוכן 2">
@@ -11301,7 +11301,7 @@
             </p:txBody>
           </p:sp>
         </mc:Choice>
-        <mc:Fallback>
+        <mc:Fallback xmlns="">
           <p:sp>
             <p:nvSpPr>
               <p:cNvPr id="3" name="מציין מיקום תוכן 2">
@@ -11935,8 +11935,8 @@
           <a:chExt cx="0" cy="0"/>
         </a:xfrm>
       </p:grpSpPr>
-      <mc:AlternateContent xmlns:mc="http://schemas.openxmlformats.org/markup-compatibility/2006">
-        <mc:Choice xmlns:a14="http://schemas.microsoft.com/office/drawing/2010/main" Requires="a14">
+      <mc:AlternateContent xmlns:mc="http://schemas.openxmlformats.org/markup-compatibility/2006" xmlns:a14="http://schemas.microsoft.com/office/drawing/2010/main">
+        <mc:Choice Requires="a14">
           <p:sp>
             <p:nvSpPr>
               <p:cNvPr id="3" name="מציין מיקום תוכן 2">
@@ -12294,7 +12294,7 @@
             </p:txBody>
           </p:sp>
         </mc:Choice>
-        <mc:Fallback>
+        <mc:Fallback xmlns="">
           <p:sp>
             <p:nvSpPr>
               <p:cNvPr id="3" name="מציין מיקום תוכן 2">
@@ -15388,15 +15388,7 @@
           <a:p>
             <a:r>
               <a:rPr lang="en-US" sz="2200" dirty="0"/>
-              <a:t>With correspondence to synthesis </a:t>
-            </a:r>
-            <a:r>
-              <a:rPr lang="en-US" sz="2200" dirty="0" err="1"/>
-              <a:t>clk</a:t>
-            </a:r>
-            <a:r>
-              <a:rPr lang="en-US" sz="2200" dirty="0"/>
-              <a:t> which is 7.5[</a:t>
+              <a:t>With correspondence to synthesis clock which is 7.5[</a:t>
             </a:r>
             <a:r>
               <a:rPr lang="en-US" sz="2200" dirty="0" err="1"/>
@@ -16006,15 +15998,7 @@
             <a:pPr lvl="1"/>
             <a:r>
               <a:rPr lang="en-US" sz="1800" dirty="0"/>
-              <a:t>Split the </a:t>
-            </a:r>
-            <a:r>
-              <a:rPr lang="en-US" sz="1800" dirty="0" err="1"/>
-              <a:t>clk</a:t>
-            </a:r>
-            <a:r>
-              <a:rPr lang="en-US" sz="1800" dirty="0"/>
-              <a:t> domain for the </a:t>
+              <a:t>Split the clock domain for the </a:t>
             </a:r>
             <a:r>
               <a:rPr lang="en-US" sz="1800" b="1" dirty="0"/>
@@ -16029,15 +16013,7 @@
             <a:pPr lvl="1"/>
             <a:r>
               <a:rPr lang="en-US" sz="1800" dirty="0"/>
-              <a:t>Split </a:t>
-            </a:r>
-            <a:r>
-              <a:rPr lang="en-US" sz="1800" dirty="0" err="1"/>
-              <a:t>clk</a:t>
-            </a:r>
-            <a:r>
-              <a:rPr lang="en-US" sz="1800" dirty="0"/>
-              <a:t> domain at the Register File, allowing the APB </a:t>
+              <a:t>Split clock domain at the Register File, allowing the APB </a:t>
             </a:r>
             <a:r>
               <a:rPr lang="en-US" sz="1800" b="1" dirty="0"/>

</xml_diff>

<commit_message>
changes and fixes to report and final ppt3
</commit_message>
<xml_diff>
--- a/Final presentation_v3.pptx
+++ b/Final presentation_v3.pptx
@@ -238,7 +238,7 @@
           <a:p>
             <a:fld id="{B3E803FA-11BA-4290-A53C-9700EB796447}" type="datetimeFigureOut">
               <a:rPr lang="he-IL" smtClean="0"/>
-              <a:t>ב'/תמוז/תש"ף</a:t>
+              <a:t>ו'/תמוז/תש"ף</a:t>
             </a:fld>
             <a:endParaRPr lang="he-IL"/>
           </a:p>
@@ -4805,7 +4805,7 @@
           <a:p>
             <a:fld id="{48A87A34-81AB-432B-8DAE-1953F412C126}" type="datetimeFigureOut">
               <a:rPr lang="en-US" smtClean="0"/>
-              <a:t>6/24/2020</a:t>
+              <a:t>6/28/2020</a:t>
             </a:fld>
             <a:endParaRPr lang="en-US" dirty="0"/>
           </a:p>
@@ -5003,7 +5003,7 @@
           <a:p>
             <a:fld id="{48A87A34-81AB-432B-8DAE-1953F412C126}" type="datetimeFigureOut">
               <a:rPr lang="en-US" smtClean="0"/>
-              <a:t>6/24/2020</a:t>
+              <a:t>6/28/2020</a:t>
             </a:fld>
             <a:endParaRPr lang="en-US" dirty="0"/>
           </a:p>
@@ -5211,7 +5211,7 @@
           <a:p>
             <a:fld id="{48A87A34-81AB-432B-8DAE-1953F412C126}" type="datetimeFigureOut">
               <a:rPr lang="en-US" smtClean="0"/>
-              <a:t>6/24/2020</a:t>
+              <a:t>6/28/2020</a:t>
             </a:fld>
             <a:endParaRPr lang="en-US" dirty="0"/>
           </a:p>
@@ -5409,7 +5409,7 @@
           <a:p>
             <a:fld id="{48A87A34-81AB-432B-8DAE-1953F412C126}" type="datetimeFigureOut">
               <a:rPr lang="en-US" smtClean="0"/>
-              <a:t>6/24/2020</a:t>
+              <a:t>6/28/2020</a:t>
             </a:fld>
             <a:endParaRPr lang="en-US" dirty="0"/>
           </a:p>
@@ -5684,7 +5684,7 @@
           <a:p>
             <a:fld id="{48A87A34-81AB-432B-8DAE-1953F412C126}" type="datetimeFigureOut">
               <a:rPr lang="en-US" smtClean="0"/>
-              <a:t>6/24/2020</a:t>
+              <a:t>6/28/2020</a:t>
             </a:fld>
             <a:endParaRPr lang="en-US" dirty="0"/>
           </a:p>
@@ -5949,7 +5949,7 @@
           <a:p>
             <a:fld id="{48A87A34-81AB-432B-8DAE-1953F412C126}" type="datetimeFigureOut">
               <a:rPr lang="en-US" smtClean="0"/>
-              <a:t>6/24/2020</a:t>
+              <a:t>6/28/2020</a:t>
             </a:fld>
             <a:endParaRPr lang="en-US" dirty="0"/>
           </a:p>
@@ -6361,7 +6361,7 @@
           <a:p>
             <a:fld id="{48A87A34-81AB-432B-8DAE-1953F412C126}" type="datetimeFigureOut">
               <a:rPr lang="en-US" smtClean="0"/>
-              <a:t>6/24/2020</a:t>
+              <a:t>6/28/2020</a:t>
             </a:fld>
             <a:endParaRPr lang="en-US" dirty="0"/>
           </a:p>
@@ -6502,7 +6502,7 @@
           <a:p>
             <a:fld id="{48A87A34-81AB-432B-8DAE-1953F412C126}" type="datetimeFigureOut">
               <a:rPr lang="en-US" smtClean="0"/>
-              <a:t>6/24/2020</a:t>
+              <a:t>6/28/2020</a:t>
             </a:fld>
             <a:endParaRPr lang="en-US" dirty="0"/>
           </a:p>
@@ -6615,7 +6615,7 @@
           <a:p>
             <a:fld id="{48A87A34-81AB-432B-8DAE-1953F412C126}" type="datetimeFigureOut">
               <a:rPr lang="en-US" smtClean="0"/>
-              <a:t>6/24/2020</a:t>
+              <a:t>6/28/2020</a:t>
             </a:fld>
             <a:endParaRPr lang="en-US" dirty="0"/>
           </a:p>
@@ -6926,7 +6926,7 @@
           <a:p>
             <a:fld id="{48A87A34-81AB-432B-8DAE-1953F412C126}" type="datetimeFigureOut">
               <a:rPr lang="en-US" smtClean="0"/>
-              <a:t>6/24/2020</a:t>
+              <a:t>6/28/2020</a:t>
             </a:fld>
             <a:endParaRPr lang="en-US" dirty="0"/>
           </a:p>
@@ -7214,7 +7214,7 @@
           <a:p>
             <a:fld id="{48A87A34-81AB-432B-8DAE-1953F412C126}" type="datetimeFigureOut">
               <a:rPr lang="en-US" smtClean="0"/>
-              <a:t>6/24/2020</a:t>
+              <a:t>6/28/2020</a:t>
             </a:fld>
             <a:endParaRPr lang="en-US" dirty="0"/>
           </a:p>
@@ -7456,7 +7456,7 @@
             <a:fld id="{48A87A34-81AB-432B-8DAE-1953F412C126}" type="datetimeFigureOut">
               <a:rPr lang="en-US" smtClean="0"/>
               <a:pPr/>
-              <a:t>6/24/2020</a:t>
+              <a:t>6/28/2020</a:t>
             </a:fld>
             <a:endParaRPr lang="en-US" dirty="0"/>
           </a:p>
@@ -10911,7 +10911,7 @@
         </p:blipFill>
         <p:spPr bwMode="auto">
           <a:xfrm>
-            <a:off x="4976821" y="1690688"/>
+            <a:off x="4976821" y="1656822"/>
             <a:ext cx="6844045" cy="3747112"/>
           </a:xfrm>
           <a:prstGeom prst="rect">
@@ -11504,8 +11504,8 @@
           </a:ln>
         </p:spPr>
       </p:pic>
-      <mc:AlternateContent xmlns:mc="http://schemas.openxmlformats.org/markup-compatibility/2006" xmlns:a14="http://schemas.microsoft.com/office/drawing/2010/main">
-        <mc:Choice Requires="a14">
+      <mc:AlternateContent xmlns:mc="http://schemas.openxmlformats.org/markup-compatibility/2006">
+        <mc:Choice xmlns:a14="http://schemas.microsoft.com/office/drawing/2010/main" Requires="a14">
           <p:sp>
             <p:nvSpPr>
               <p:cNvPr id="7" name="Content Placeholder 2">
@@ -11804,22 +11804,16 @@
                         </m:e>
                       </m:d>
                       <m:r>
-                        <a:rPr lang="en-US" i="1">
+                        <a:rPr lang="en-US" i="1" smtClean="0">
                           <a:latin typeface="Cambria Math" panose="02040503050406030204" pitchFamily="18" charset="0"/>
                         </a:rPr>
-                        <m:t>+</m:t>
+                        <m:t> </m:t>
                       </m:r>
                       <m:r>
                         <a:rPr lang="en-US" i="1">
                           <a:latin typeface="Cambria Math" panose="02040503050406030204" pitchFamily="18" charset="0"/>
                         </a:rPr>
-                        <m:t>3</m:t>
-                      </m:r>
-                      <m:r>
-                        <a:rPr lang="en-US" i="1">
-                          <a:latin typeface="Cambria Math" panose="02040503050406030204" pitchFamily="18" charset="0"/>
-                        </a:rPr>
-                        <m:t>  [</m:t>
+                        <m:t>[</m:t>
                       </m:r>
                       <m:r>
                         <a:rPr lang="en-US" i="1">
@@ -11860,7 +11854,7 @@
             </p:txBody>
           </p:sp>
         </mc:Choice>
-        <mc:Fallback xmlns="">
+        <mc:Fallback>
           <p:sp>
             <p:nvSpPr>
               <p:cNvPr id="7" name="Content Placeholder 2">
@@ -12510,8 +12504,8 @@
           </a:p>
         </p:txBody>
       </p:sp>
-      <mc:AlternateContent xmlns:mc="http://schemas.openxmlformats.org/markup-compatibility/2006" xmlns:a14="http://schemas.microsoft.com/office/drawing/2010/main">
-        <mc:Choice Requires="a14">
+      <mc:AlternateContent xmlns:mc="http://schemas.openxmlformats.org/markup-compatibility/2006">
+        <mc:Choice xmlns:a14="http://schemas.microsoft.com/office/drawing/2010/main" Requires="a14">
           <p:sp>
             <p:nvSpPr>
               <p:cNvPr id="2" name="Rectangle 1">
@@ -12547,7 +12541,7 @@
                     </m:oMathParaPr>
                     <m:oMath xmlns:m="http://schemas.openxmlformats.org/officeDocument/2006/math">
                       <m:r>
-                        <a:rPr lang="en-US" sz="2400" i="1">
+                        <a:rPr lang="en-US" sz="2400" i="1" smtClean="0">
                           <a:latin typeface="Cambria Math" panose="02040503050406030204" pitchFamily="18" charset="0"/>
                         </a:rPr>
                         <m:t>𝑙𝑎𝑡𝑒𝑛𝑐</m:t>
@@ -12646,18 +12640,6 @@
                         <a:rPr lang="en-US" sz="2400" i="1">
                           <a:latin typeface="Cambria Math" panose="02040503050406030204" pitchFamily="18" charset="0"/>
                         </a:rPr>
-                        <m:t>+</m:t>
-                      </m:r>
-                      <m:r>
-                        <a:rPr lang="en-US" sz="2400" i="1">
-                          <a:latin typeface="Cambria Math" panose="02040503050406030204" pitchFamily="18" charset="0"/>
-                        </a:rPr>
-                        <m:t>1</m:t>
-                      </m:r>
-                      <m:r>
-                        <a:rPr lang="en-US" sz="2400" i="1">
-                          <a:latin typeface="Cambria Math" panose="02040503050406030204" pitchFamily="18" charset="0"/>
-                        </a:rPr>
                         <m:t>=</m:t>
                       </m:r>
                       <m:r>
@@ -12682,25 +12664,13 @@
                         <a:rPr lang="en-US" sz="2400" i="1">
                           <a:latin typeface="Cambria Math" panose="02040503050406030204" pitchFamily="18" charset="0"/>
                         </a:rPr>
-                        <m:t>+</m:t>
-                      </m:r>
-                      <m:r>
-                        <a:rPr lang="en-US" sz="2400" i="1">
-                          <a:latin typeface="Cambria Math" panose="02040503050406030204" pitchFamily="18" charset="0"/>
-                        </a:rPr>
-                        <m:t>1</m:t>
-                      </m:r>
-                      <m:r>
-                        <a:rPr lang="en-US" sz="2400" i="1">
-                          <a:latin typeface="Cambria Math" panose="02040503050406030204" pitchFamily="18" charset="0"/>
-                        </a:rPr>
                         <m:t>=</m:t>
                       </m:r>
                       <m:r>
-                        <a:rPr lang="en-US" sz="2400" i="1">
+                        <a:rPr lang="he-IL" sz="2400" b="0" i="1" smtClean="0">
                           <a:latin typeface="Cambria Math" panose="02040503050406030204" pitchFamily="18" charset="0"/>
                         </a:rPr>
-                        <m:t>10</m:t>
+                        <m:t>9</m:t>
                       </m:r>
                       <m:r>
                         <a:rPr lang="en-US" sz="2400" i="1">
@@ -12743,7 +12713,7 @@
             </p:txBody>
           </p:sp>
         </mc:Choice>
-        <mc:Fallback xmlns="">
+        <mc:Fallback>
           <p:sp>
             <p:nvSpPr>
               <p:cNvPr id="2" name="Rectangle 1">
@@ -12846,8 +12816,8 @@
           </a:p>
         </p:txBody>
       </p:sp>
-      <mc:AlternateContent xmlns:mc="http://schemas.openxmlformats.org/markup-compatibility/2006" xmlns:a14="http://schemas.microsoft.com/office/drawing/2010/main">
-        <mc:Choice Requires="a14">
+      <mc:AlternateContent xmlns:mc="http://schemas.openxmlformats.org/markup-compatibility/2006">
+        <mc:Choice xmlns:a14="http://schemas.microsoft.com/office/drawing/2010/main" Requires="a14">
           <p:sp>
             <p:nvSpPr>
               <p:cNvPr id="3" name="Content Placeholder 2">
@@ -13072,22 +13042,10 @@
                         <m:t>+</m:t>
                       </m:r>
                       <m:r>
-                        <a:rPr lang="en-US" i="1">
+                        <a:rPr lang="he-IL" b="0" i="1" smtClean="0">
                           <a:latin typeface="Cambria Math" panose="02040503050406030204" pitchFamily="18" charset="0"/>
                         </a:rPr>
-                        <m:t>3</m:t>
-                      </m:r>
-                      <m:r>
-                        <a:rPr lang="en-US" i="1">
-                          <a:latin typeface="Cambria Math" panose="02040503050406030204" pitchFamily="18" charset="0"/>
-                        </a:rPr>
-                        <m:t>+</m:t>
-                      </m:r>
-                      <m:r>
-                        <a:rPr lang="en-US" i="1">
-                          <a:latin typeface="Cambria Math" panose="02040503050406030204" pitchFamily="18" charset="0"/>
-                        </a:rPr>
-                        <m:t>10</m:t>
+                        <m:t>9</m:t>
                       </m:r>
                       <m:r>
                         <a:rPr lang="en-US" i="1">
@@ -13133,10 +13091,10 @@
                         <m:t>=</m:t>
                       </m:r>
                       <m:r>
-                        <a:rPr lang="en-US" i="1">
+                        <a:rPr lang="he-IL" b="0" i="1" smtClean="0">
                           <a:latin typeface="Cambria Math" panose="02040503050406030204" pitchFamily="18" charset="0"/>
                         </a:rPr>
-                        <m:t>16</m:t>
+                        <m:t>12</m:t>
                       </m:r>
                       <m:r>
                         <a:rPr lang="en-US" i="1">
@@ -13360,7 +13318,7 @@
             </p:txBody>
           </p:sp>
         </mc:Choice>
-        <mc:Fallback xmlns="">
+        <mc:Fallback>
           <p:sp>
             <p:nvSpPr>
               <p:cNvPr id="3" name="Content Placeholder 2">

</xml_diff>